<commit_message>
Aufgaben, Projektplan und Zwischen-Präsi aktualisiert.
</commit_message>
<xml_diff>
--- a/Dokumente/Zwischenstand zum 2012 04 21.pptx
+++ b/Dokumente/Zwischenstand zum 2012 04 21.pptx
@@ -5,16 +5,24 @@
     <p:sldMasterId id="2147483648" r:id="rId1"/>
   </p:sldMasterIdLst>
   <p:notesMasterIdLst>
-    <p:notesMasterId r:id="rId9"/>
+    <p:notesMasterId r:id="rId17"/>
   </p:notesMasterIdLst>
   <p:sldIdLst>
     <p:sldId id="256" r:id="rId2"/>
     <p:sldId id="257" r:id="rId3"/>
     <p:sldId id="258" r:id="rId4"/>
     <p:sldId id="262" r:id="rId5"/>
-    <p:sldId id="261" r:id="rId6"/>
-    <p:sldId id="259" r:id="rId7"/>
-    <p:sldId id="260" r:id="rId8"/>
+    <p:sldId id="263" r:id="rId6"/>
+    <p:sldId id="261" r:id="rId7"/>
+    <p:sldId id="264" r:id="rId8"/>
+    <p:sldId id="259" r:id="rId9"/>
+    <p:sldId id="265" r:id="rId10"/>
+    <p:sldId id="260" r:id="rId11"/>
+    <p:sldId id="267" r:id="rId12"/>
+    <p:sldId id="268" r:id="rId13"/>
+    <p:sldId id="269" r:id="rId14"/>
+    <p:sldId id="266" r:id="rId15"/>
+    <p:sldId id="270" r:id="rId16"/>
   </p:sldIdLst>
   <p:sldSz cx="9144000" cy="6858000" type="screen4x3"/>
   <p:notesSz cx="6858000" cy="9144000"/>
@@ -119,7 +127,18 @@
 <file path=ppt/commentAuthors.xml><?xml version="1.0" encoding="utf-8"?>
 <p:cmAuthorLst xmlns:a="http://schemas.openxmlformats.org/drawingml/2006/main" xmlns:r="http://schemas.openxmlformats.org/officeDocument/2006/relationships" xmlns:p="http://schemas.openxmlformats.org/presentationml/2006/main">
   <p:cmAuthor id="0" name="MSGxxxxx" initials="M" lastIdx="1" clrIdx="0"/>
+  <p:cmAuthor id="1" name="Alexander" initials="A" lastIdx="3" clrIdx="1"/>
 </p:cmAuthorLst>
+</file>
+
+<file path=ppt/comments/comment1.xml><?xml version="1.0" encoding="utf-8"?>
+<p:cmLst xmlns:a="http://schemas.openxmlformats.org/drawingml/2006/main" xmlns:r="http://schemas.openxmlformats.org/officeDocument/2006/relationships" xmlns:p="http://schemas.openxmlformats.org/presentationml/2006/main">
+  <p:cm authorId="1" dt="2012-04-12T22:07:18.671" idx="3">
+    <p:pos x="1728" y="1025"/>
+    <p:text>Was wollen wir hier zeigen?
+Sinnvoll?</p:text>
+  </p:cm>
+</p:cmLst>
 </file>
 
 <file path=ppt/diagrams/colors1.xml><?xml version="1.0" encoding="utf-8"?>
@@ -884,7 +903,7 @@
       </dgm:t>
     </dgm:pt>
     <dgm:pt modelId="{944B7687-9390-4A1A-858A-D031F080161B}">
-      <dgm:prSet phldrT="[Text]"/>
+      <dgm:prSet phldrT="[Text]" custT="1"/>
       <dgm:spPr>
         <a:solidFill>
           <a:schemeClr val="accent6">
@@ -897,10 +916,10 @@
         <a:lstStyle/>
         <a:p>
           <a:r>
-            <a:rPr lang="de-DE" dirty="0" err="1" smtClean="0"/>
+            <a:rPr lang="de-DE" sz="2400" b="1" dirty="0" err="1" smtClean="0"/>
             <a:t>Inception</a:t>
           </a:r>
-          <a:endParaRPr lang="de-DE" dirty="0"/>
+          <a:endParaRPr lang="de-DE" sz="2400" b="1" dirty="0"/>
         </a:p>
       </dgm:t>
     </dgm:pt>
@@ -911,7 +930,7 @@
         <a:bodyPr/>
         <a:lstStyle/>
         <a:p>
-          <a:endParaRPr lang="de-DE"/>
+          <a:endParaRPr lang="de-DE" sz="2400" b="1"/>
         </a:p>
       </dgm:t>
     </dgm:pt>
@@ -922,22 +941,22 @@
         <a:bodyPr/>
         <a:lstStyle/>
         <a:p>
-          <a:endParaRPr lang="de-DE"/>
+          <a:endParaRPr lang="de-DE" sz="2400" b="1"/>
         </a:p>
       </dgm:t>
     </dgm:pt>
     <dgm:pt modelId="{D676ACFF-D864-4A74-BC08-FFF521911366}">
-      <dgm:prSet phldrT="[Text]"/>
+      <dgm:prSet phldrT="[Text]" custT="1"/>
       <dgm:spPr/>
       <dgm:t>
         <a:bodyPr/>
         <a:lstStyle/>
         <a:p>
           <a:r>
-            <a:rPr lang="de-DE" dirty="0" smtClean="0"/>
+            <a:rPr lang="de-DE" sz="2400" b="1" dirty="0" smtClean="0"/>
             <a:t>Transition</a:t>
           </a:r>
-          <a:endParaRPr lang="de-DE" dirty="0"/>
+          <a:endParaRPr lang="de-DE" sz="2400" b="1" dirty="0"/>
         </a:p>
       </dgm:t>
     </dgm:pt>
@@ -948,7 +967,7 @@
         <a:bodyPr/>
         <a:lstStyle/>
         <a:p>
-          <a:endParaRPr lang="de-DE"/>
+          <a:endParaRPr lang="de-DE" sz="2400" b="1"/>
         </a:p>
       </dgm:t>
     </dgm:pt>
@@ -959,12 +978,12 @@
         <a:bodyPr/>
         <a:lstStyle/>
         <a:p>
-          <a:endParaRPr lang="de-DE"/>
+          <a:endParaRPr lang="de-DE" sz="2400" b="1"/>
         </a:p>
       </dgm:t>
     </dgm:pt>
     <dgm:pt modelId="{3A8DBD30-33F4-4BF2-A3E8-CE2DB89DAAF3}">
-      <dgm:prSet phldrT="[Text]"/>
+      <dgm:prSet phldrT="[Text]" custT="1"/>
       <dgm:spPr>
         <a:solidFill>
           <a:srgbClr val="CC0066"/>
@@ -975,10 +994,10 @@
         <a:lstStyle/>
         <a:p>
           <a:r>
-            <a:rPr lang="de-DE" dirty="0" smtClean="0"/>
+            <a:rPr lang="de-DE" sz="2400" b="1" dirty="0" smtClean="0"/>
             <a:t>Elaboration</a:t>
           </a:r>
-          <a:endParaRPr lang="de-DE" dirty="0"/>
+          <a:endParaRPr lang="de-DE" sz="2400" b="1" dirty="0"/>
         </a:p>
       </dgm:t>
     </dgm:pt>
@@ -989,7 +1008,7 @@
         <a:bodyPr/>
         <a:lstStyle/>
         <a:p>
-          <a:endParaRPr lang="de-DE"/>
+          <a:endParaRPr lang="de-DE" sz="2400" b="1"/>
         </a:p>
       </dgm:t>
     </dgm:pt>
@@ -1000,12 +1019,12 @@
         <a:bodyPr/>
         <a:lstStyle/>
         <a:p>
-          <a:endParaRPr lang="de-DE"/>
+          <a:endParaRPr lang="de-DE" sz="2400" b="1"/>
         </a:p>
       </dgm:t>
     </dgm:pt>
     <dgm:pt modelId="{9FFECB61-C811-496D-9F12-F63AD9A2D9EE}">
-      <dgm:prSet phldrT="[Text]"/>
+      <dgm:prSet phldrT="[Text]" custT="1"/>
       <dgm:spPr>
         <a:solidFill>
           <a:srgbClr val="00CC00"/>
@@ -1016,10 +1035,10 @@
         <a:lstStyle/>
         <a:p>
           <a:r>
-            <a:rPr lang="de-DE" dirty="0" err="1" smtClean="0"/>
+            <a:rPr lang="de-DE" sz="2400" b="1" dirty="0" err="1" smtClean="0"/>
             <a:t>Construction</a:t>
           </a:r>
-          <a:endParaRPr lang="de-DE" dirty="0" smtClean="0"/>
+          <a:endParaRPr lang="de-DE" sz="2400" b="1" dirty="0" smtClean="0"/>
         </a:p>
       </dgm:t>
     </dgm:pt>
@@ -1030,7 +1049,7 @@
         <a:bodyPr/>
         <a:lstStyle/>
         <a:p>
-          <a:endParaRPr lang="de-DE"/>
+          <a:endParaRPr lang="de-DE" sz="2400" b="1"/>
         </a:p>
       </dgm:t>
     </dgm:pt>
@@ -1041,7 +1060,7 @@
         <a:bodyPr/>
         <a:lstStyle/>
         <a:p>
-          <a:endParaRPr lang="de-DE"/>
+          <a:endParaRPr lang="de-DE" sz="2400" b="1"/>
         </a:p>
       </dgm:t>
     </dgm:pt>
@@ -1276,12 +1295,12 @@
         </a:fontRef>
       </dsp:style>
       <dsp:txBody>
-        <a:bodyPr spcFirstLastPara="0" vert="horz" wrap="square" lIns="45720" tIns="45720" rIns="45720" bIns="45720" numCol="1" spcCol="1270" anchor="ctr" anchorCtr="0">
+        <a:bodyPr spcFirstLastPara="0" vert="horz" wrap="square" lIns="30480" tIns="30480" rIns="30480" bIns="30480" numCol="1" spcCol="1270" anchor="ctr" anchorCtr="0">
           <a:noAutofit/>
         </a:bodyPr>
         <a:lstStyle/>
         <a:p>
-          <a:pPr lvl="0" algn="ctr" defTabSz="1600200">
+          <a:pPr lvl="0" algn="ctr" defTabSz="1066800">
             <a:lnSpc>
               <a:spcPct val="90000"/>
             </a:lnSpc>
@@ -1293,10 +1312,10 @@
             </a:spcAft>
           </a:pPr>
           <a:r>
-            <a:rPr lang="de-DE" sz="3600" kern="1200" dirty="0" err="1" smtClean="0"/>
+            <a:rPr lang="de-DE" sz="2400" b="1" kern="1200" dirty="0" err="1" smtClean="0"/>
             <a:t>Inception</a:t>
           </a:r>
-          <a:endParaRPr lang="de-DE" sz="3600" kern="1200" dirty="0"/>
+          <a:endParaRPr lang="de-DE" sz="2400" b="1" kern="1200" dirty="0"/>
         </a:p>
       </dsp:txBody>
       <dsp:txXfrm>
@@ -1390,12 +1409,12 @@
         </a:fontRef>
       </dsp:style>
       <dsp:txBody>
-        <a:bodyPr spcFirstLastPara="0" vert="horz" wrap="square" lIns="36830" tIns="36830" rIns="36830" bIns="36830" numCol="1" spcCol="1270" anchor="ctr" anchorCtr="0">
+        <a:bodyPr spcFirstLastPara="0" vert="horz" wrap="square" lIns="30480" tIns="30480" rIns="30480" bIns="30480" numCol="1" spcCol="1270" anchor="ctr" anchorCtr="0">
           <a:noAutofit/>
         </a:bodyPr>
         <a:lstStyle/>
         <a:p>
-          <a:pPr lvl="0" algn="ctr" defTabSz="1289050">
+          <a:pPr lvl="0" algn="ctr" defTabSz="1066800">
             <a:lnSpc>
               <a:spcPct val="90000"/>
             </a:lnSpc>
@@ -1407,10 +1426,10 @@
             </a:spcAft>
           </a:pPr>
           <a:r>
-            <a:rPr lang="de-DE" sz="2900" kern="1200" dirty="0" smtClean="0"/>
+            <a:rPr lang="de-DE" sz="2400" b="1" kern="1200" dirty="0" smtClean="0"/>
             <a:t>Elaboration</a:t>
           </a:r>
-          <a:endParaRPr lang="de-DE" sz="2900" kern="1200" dirty="0"/>
+          <a:endParaRPr lang="de-DE" sz="2400" b="1" kern="1200" dirty="0"/>
         </a:p>
       </dsp:txBody>
       <dsp:txXfrm>
@@ -1504,12 +1523,12 @@
         </a:fontRef>
       </dsp:style>
       <dsp:txBody>
-        <a:bodyPr spcFirstLastPara="0" vert="horz" wrap="square" lIns="36830" tIns="36830" rIns="36830" bIns="36830" numCol="1" spcCol="1270" anchor="ctr" anchorCtr="0">
+        <a:bodyPr spcFirstLastPara="0" vert="horz" wrap="square" lIns="30480" tIns="30480" rIns="30480" bIns="30480" numCol="1" spcCol="1270" anchor="ctr" anchorCtr="0">
           <a:noAutofit/>
         </a:bodyPr>
         <a:lstStyle/>
         <a:p>
-          <a:pPr lvl="0" algn="ctr" defTabSz="1289050">
+          <a:pPr lvl="0" algn="ctr" defTabSz="1066800">
             <a:lnSpc>
               <a:spcPct val="90000"/>
             </a:lnSpc>
@@ -1521,10 +1540,10 @@
             </a:spcAft>
           </a:pPr>
           <a:r>
-            <a:rPr lang="de-DE" sz="2900" kern="1200" dirty="0" err="1" smtClean="0"/>
+            <a:rPr lang="de-DE" sz="2400" b="1" kern="1200" dirty="0" err="1" smtClean="0"/>
             <a:t>Construction</a:t>
           </a:r>
-          <a:endParaRPr lang="de-DE" sz="2900" kern="1200" dirty="0" smtClean="0"/>
+          <a:endParaRPr lang="de-DE" sz="2400" b="1" kern="1200" dirty="0" smtClean="0"/>
         </a:p>
       </dsp:txBody>
       <dsp:txXfrm>
@@ -1623,12 +1642,12 @@
         </a:fontRef>
       </dsp:style>
       <dsp:txBody>
-        <a:bodyPr spcFirstLastPara="0" vert="horz" wrap="square" lIns="45720" tIns="45720" rIns="45720" bIns="45720" numCol="1" spcCol="1270" anchor="ctr" anchorCtr="0">
+        <a:bodyPr spcFirstLastPara="0" vert="horz" wrap="square" lIns="30480" tIns="30480" rIns="30480" bIns="30480" numCol="1" spcCol="1270" anchor="ctr" anchorCtr="0">
           <a:noAutofit/>
         </a:bodyPr>
         <a:lstStyle/>
         <a:p>
-          <a:pPr lvl="0" algn="ctr" defTabSz="1600200">
+          <a:pPr lvl="0" algn="ctr" defTabSz="1066800">
             <a:lnSpc>
               <a:spcPct val="90000"/>
             </a:lnSpc>
@@ -1640,10 +1659,10 @@
             </a:spcAft>
           </a:pPr>
           <a:r>
-            <a:rPr lang="de-DE" sz="3600" kern="1200" dirty="0" smtClean="0"/>
+            <a:rPr lang="de-DE" sz="2400" b="1" kern="1200" dirty="0" smtClean="0"/>
             <a:t>Transition</a:t>
           </a:r>
-          <a:endParaRPr lang="de-DE" sz="3600" kern="1200" dirty="0"/>
+          <a:endParaRPr lang="de-DE" sz="2400" b="1" kern="1200" dirty="0"/>
         </a:p>
       </dsp:txBody>
       <dsp:txXfrm>
@@ -3082,7 +3101,7 @@
             <a:fld id="{31195639-3003-43D9-AD76-FA6B58D41938}" type="datetimeFigureOut">
               <a:rPr lang="de-DE" smtClean="0"/>
               <a:pPr/>
-              <a:t>11.04.2012</a:t>
+              <a:t>12.04.2012</a:t>
             </a:fld>
             <a:endParaRPr lang="de-DE"/>
           </a:p>
@@ -6169,7 +6188,7 @@
             <a:lum/>
             <a:extLst>
               <a:ext uri="{28A0092B-C50C-407E-A947-70E740481C1C}">
-                <a14:useLocalDpi xmlns:lc="http://schemas.openxmlformats.org/drawingml/2006/lockedCanvas" xmlns:pic="http://schemas.openxmlformats.org/drawingml/2006/picture" xmlns:a14="http://schemas.microsoft.com/office/drawing/2010/main" xmlns:wps="http://schemas.microsoft.com/office/word/2010/wordprocessingShape" xmlns:wpi="http://schemas.microsoft.com/office/word/2010/wordprocessingInk" xmlns:wpg="http://schemas.microsoft.com/office/word/2010/wordprocessingGroup" xmlns:w14="http://schemas.microsoft.com/office/word/2010/wordml" xmlns:w="http://schemas.openxmlformats.org/wordprocessingml/2006/main" xmlns:w10="urn:schemas-microsoft-com:office:word" xmlns:wp14="http://schemas.microsoft.com/office/word/2010/wordprocessingDrawing" xmlns:v="urn:schemas-microsoft-com:vml" xmlns:o="urn:schemas-microsoft-com:office:office" xmlns:mc="http://schemas.openxmlformats.org/markup-compatibility/2006" xmlns:wpc="http://schemas.microsoft.com/office/word/2010/wordprocessingCanvas" xmlns="" xmlns:wne="http://schemas.microsoft.com/office/word/2006/wordml" xmlns:wp="http://schemas.openxmlformats.org/drawingml/2006/wordprocessingDrawing" xmlns:m="http://schemas.openxmlformats.org/officeDocument/2006/math" xmlns:ve="http://schemas.openxmlformats.org/markup-compatibility/2006" val="0"/>
+                <a14:useLocalDpi xmlns:ve="http://schemas.openxmlformats.org/markup-compatibility/2006" xmlns:m="http://schemas.openxmlformats.org/officeDocument/2006/math" xmlns:wp="http://schemas.openxmlformats.org/drawingml/2006/wordprocessingDrawing" xmlns:wne="http://schemas.microsoft.com/office/word/2006/wordml" xmlns="" xmlns:wpc="http://schemas.microsoft.com/office/word/2010/wordprocessingCanvas" xmlns:mc="http://schemas.openxmlformats.org/markup-compatibility/2006" xmlns:o="urn:schemas-microsoft-com:office:office" xmlns:v="urn:schemas-microsoft-com:vml" xmlns:wp14="http://schemas.microsoft.com/office/word/2010/wordprocessingDrawing" xmlns:w10="urn:schemas-microsoft-com:office:word" xmlns:w="http://schemas.openxmlformats.org/wordprocessingml/2006/main" xmlns:w14="http://schemas.microsoft.com/office/word/2010/wordml" xmlns:wpg="http://schemas.microsoft.com/office/word/2010/wordprocessingGroup" xmlns:wpi="http://schemas.microsoft.com/office/word/2010/wordprocessingInk" xmlns:wps="http://schemas.microsoft.com/office/word/2010/wordprocessingShape" xmlns:a14="http://schemas.microsoft.com/office/drawing/2010/main" xmlns:pic="http://schemas.openxmlformats.org/drawingml/2006/picture" xmlns:lc="http://schemas.openxmlformats.org/drawingml/2006/lockedCanvas" val="0"/>
               </a:ext>
             </a:extLst>
           </a:blip>
@@ -6634,6 +6653,1422 @@
 </p:sld>
 </file>
 
+<file path=ppt/slides/slide10.xml><?xml version="1.0" encoding="utf-8"?>
+<p:sld xmlns:a="http://schemas.openxmlformats.org/drawingml/2006/main" xmlns:r="http://schemas.openxmlformats.org/officeDocument/2006/relationships" xmlns:p="http://schemas.openxmlformats.org/presentationml/2006/main">
+  <p:cSld>
+    <p:spTree>
+      <p:nvGrpSpPr>
+        <p:cNvPr id="1" name=""/>
+        <p:cNvGrpSpPr/>
+        <p:nvPr/>
+      </p:nvGrpSpPr>
+      <p:grpSpPr>
+        <a:xfrm>
+          <a:off x="0" y="0"/>
+          <a:ext cx="0" cy="0"/>
+          <a:chOff x="0" y="0"/>
+          <a:chExt cx="0" cy="0"/>
+        </a:xfrm>
+      </p:grpSpPr>
+      <p:sp>
+        <p:nvSpPr>
+          <p:cNvPr id="2" name="Titel 1"/>
+          <p:cNvSpPr>
+            <a:spLocks noGrp="1"/>
+          </p:cNvSpPr>
+          <p:nvPr>
+            <p:ph type="title"/>
+          </p:nvPr>
+        </p:nvSpPr>
+        <p:spPr/>
+        <p:txBody>
+          <a:bodyPr/>
+          <a:lstStyle/>
+          <a:p>
+            <a:r>
+              <a:rPr lang="de-DE" dirty="0" smtClean="0"/>
+              <a:t>Aktuelle Ergebnisse</a:t>
+            </a:r>
+            <a:endParaRPr lang="de-DE" dirty="0"/>
+          </a:p>
+        </p:txBody>
+      </p:sp>
+      <p:sp>
+        <p:nvSpPr>
+          <p:cNvPr id="3" name="Inhaltsplatzhalter 2"/>
+          <p:cNvSpPr>
+            <a:spLocks noGrp="1"/>
+          </p:cNvSpPr>
+          <p:nvPr>
+            <p:ph idx="1"/>
+          </p:nvPr>
+        </p:nvSpPr>
+        <p:spPr>
+          <a:xfrm>
+            <a:off x="457200" y="1600200"/>
+            <a:ext cx="8686800" cy="4525963"/>
+          </a:xfrm>
+        </p:spPr>
+        <p:txBody>
+          <a:bodyPr>
+            <a:noAutofit/>
+          </a:bodyPr>
+          <a:lstStyle/>
+          <a:p>
+            <a:r>
+              <a:rPr lang="de-DE" dirty="0" smtClean="0"/>
+              <a:t>Dokumente</a:t>
+            </a:r>
+          </a:p>
+          <a:p>
+            <a:pPr lvl="1"/>
+            <a:r>
+              <a:rPr lang="de-DE" dirty="0" smtClean="0"/>
+              <a:t>Projekt-Exposé</a:t>
+            </a:r>
+          </a:p>
+          <a:p>
+            <a:pPr lvl="1"/>
+            <a:r>
+              <a:rPr lang="de-DE" dirty="0" smtClean="0"/>
+              <a:t>Projektplan</a:t>
+            </a:r>
+          </a:p>
+          <a:p>
+            <a:pPr lvl="1"/>
+            <a:r>
+              <a:rPr lang="de-DE" dirty="0" smtClean="0"/>
+              <a:t>Lastenheft</a:t>
+            </a:r>
+          </a:p>
+          <a:p>
+            <a:pPr lvl="1"/>
+            <a:r>
+              <a:rPr lang="de-DE" dirty="0" smtClean="0"/>
+              <a:t>Glossar (Begriffsdefinitionen)</a:t>
+            </a:r>
+          </a:p>
+          <a:p>
+            <a:pPr lvl="1"/>
+            <a:r>
+              <a:rPr lang="de-DE" dirty="0" smtClean="0"/>
+              <a:t>Risikoanalyse</a:t>
+            </a:r>
+          </a:p>
+          <a:p>
+            <a:pPr lvl="1"/>
+            <a:r>
+              <a:rPr lang="de-DE" dirty="0" smtClean="0"/>
+              <a:t>Szenarien</a:t>
+            </a:r>
+          </a:p>
+          <a:p>
+            <a:pPr lvl="1"/>
+            <a:r>
+              <a:rPr lang="de-DE" dirty="0" smtClean="0"/>
+              <a:t>Wirtschaftslichkeitsbetrachtung</a:t>
+            </a:r>
+            <a:endParaRPr lang="de-DE" dirty="0"/>
+          </a:p>
+        </p:txBody>
+      </p:sp>
+      <p:sp>
+        <p:nvSpPr>
+          <p:cNvPr id="4" name="Datumsplatzhalter 3"/>
+          <p:cNvSpPr>
+            <a:spLocks noGrp="1"/>
+          </p:cNvSpPr>
+          <p:nvPr>
+            <p:ph type="dt" sz="half" idx="10"/>
+          </p:nvPr>
+        </p:nvSpPr>
+        <p:spPr/>
+        <p:txBody>
+          <a:bodyPr/>
+          <a:lstStyle/>
+          <a:p>
+            <a:r>
+              <a:rPr lang="de-DE" smtClean="0"/>
+              <a:t>21.04.2012</a:t>
+            </a:r>
+            <a:endParaRPr lang="de-DE" dirty="0"/>
+          </a:p>
+        </p:txBody>
+      </p:sp>
+      <p:sp>
+        <p:nvSpPr>
+          <p:cNvPr id="5" name="Foliennummernplatzhalter 4"/>
+          <p:cNvSpPr>
+            <a:spLocks noGrp="1"/>
+          </p:cNvSpPr>
+          <p:nvPr>
+            <p:ph type="sldNum" sz="quarter" idx="12"/>
+          </p:nvPr>
+        </p:nvSpPr>
+        <p:spPr/>
+        <p:txBody>
+          <a:bodyPr/>
+          <a:lstStyle/>
+          <a:p>
+            <a:fld id="{6C6AE60A-B69C-4790-82F7-3882EDF23186}" type="slidenum">
+              <a:rPr lang="de-DE" smtClean="0"/>
+              <a:pPr/>
+              <a:t>10</a:t>
+            </a:fld>
+            <a:endParaRPr lang="de-DE" dirty="0"/>
+          </a:p>
+        </p:txBody>
+      </p:sp>
+      <p:sp>
+        <p:nvSpPr>
+          <p:cNvPr id="6" name="Fußzeilenplatzhalter 5"/>
+          <p:cNvSpPr>
+            <a:spLocks noGrp="1"/>
+          </p:cNvSpPr>
+          <p:nvPr>
+            <p:ph type="ftr" sz="quarter" idx="11"/>
+          </p:nvPr>
+        </p:nvSpPr>
+        <p:spPr/>
+        <p:txBody>
+          <a:bodyPr/>
+          <a:lstStyle/>
+          <a:p>
+            <a:r>
+              <a:rPr lang="de-DE" smtClean="0"/>
+              <a:t>Eventalizer</a:t>
+            </a:r>
+            <a:endParaRPr lang="de-DE" dirty="0"/>
+          </a:p>
+        </p:txBody>
+      </p:sp>
+    </p:spTree>
+  </p:cSld>
+  <p:clrMapOvr>
+    <a:masterClrMapping/>
+  </p:clrMapOvr>
+  <p:timing>
+    <p:tnLst>
+      <p:par>
+        <p:cTn id="1" dur="indefinite" restart="never" nodeType="tmRoot"/>
+      </p:par>
+    </p:tnLst>
+  </p:timing>
+</p:sld>
+</file>
+
+<file path=ppt/slides/slide11.xml><?xml version="1.0" encoding="utf-8"?>
+<p:sld xmlns:a="http://schemas.openxmlformats.org/drawingml/2006/main" xmlns:r="http://schemas.openxmlformats.org/officeDocument/2006/relationships" xmlns:p="http://schemas.openxmlformats.org/presentationml/2006/main">
+  <p:cSld>
+    <p:spTree>
+      <p:nvGrpSpPr>
+        <p:cNvPr id="1" name=""/>
+        <p:cNvGrpSpPr/>
+        <p:nvPr/>
+      </p:nvGrpSpPr>
+      <p:grpSpPr>
+        <a:xfrm>
+          <a:off x="0" y="0"/>
+          <a:ext cx="0" cy="0"/>
+          <a:chOff x="0" y="0"/>
+          <a:chExt cx="0" cy="0"/>
+        </a:xfrm>
+      </p:grpSpPr>
+      <p:sp>
+        <p:nvSpPr>
+          <p:cNvPr id="7" name="Abgerundetes Rechteck 6"/>
+          <p:cNvSpPr/>
+          <p:nvPr/>
+        </p:nvSpPr>
+        <p:spPr>
+          <a:xfrm>
+            <a:off x="755576" y="3212976"/>
+            <a:ext cx="4752528" cy="504056"/>
+          </a:xfrm>
+          <a:prstGeom prst="roundRect">
+            <a:avLst/>
+          </a:prstGeom>
+          <a:solidFill>
+            <a:schemeClr val="accent1">
+              <a:lumMod val="20000"/>
+              <a:lumOff val="80000"/>
+            </a:schemeClr>
+          </a:solidFill>
+          <a:ln>
+            <a:solidFill>
+              <a:schemeClr val="accent1">
+                <a:lumMod val="20000"/>
+                <a:lumOff val="80000"/>
+              </a:schemeClr>
+            </a:solidFill>
+          </a:ln>
+        </p:spPr>
+        <p:style>
+          <a:lnRef idx="2">
+            <a:schemeClr val="accent1">
+              <a:shade val="50000"/>
+            </a:schemeClr>
+          </a:lnRef>
+          <a:fillRef idx="1">
+            <a:schemeClr val="accent1"/>
+          </a:fillRef>
+          <a:effectRef idx="0">
+            <a:schemeClr val="accent1"/>
+          </a:effectRef>
+          <a:fontRef idx="minor">
+            <a:schemeClr val="lt1"/>
+          </a:fontRef>
+        </p:style>
+        <p:txBody>
+          <a:bodyPr rtlCol="0" anchor="ctr"/>
+          <a:lstStyle/>
+          <a:p>
+            <a:pPr algn="ctr"/>
+            <a:endParaRPr lang="de-DE"/>
+          </a:p>
+        </p:txBody>
+      </p:sp>
+      <p:sp>
+        <p:nvSpPr>
+          <p:cNvPr id="3" name="Inhaltsplatzhalter 2"/>
+          <p:cNvSpPr>
+            <a:spLocks noGrp="1"/>
+          </p:cNvSpPr>
+          <p:nvPr>
+            <p:ph idx="1"/>
+          </p:nvPr>
+        </p:nvSpPr>
+        <p:spPr>
+          <a:xfrm>
+            <a:off x="457200" y="1600200"/>
+            <a:ext cx="8686800" cy="4525963"/>
+          </a:xfrm>
+        </p:spPr>
+        <p:txBody>
+          <a:bodyPr>
+            <a:noAutofit/>
+          </a:bodyPr>
+          <a:lstStyle/>
+          <a:p>
+            <a:r>
+              <a:rPr lang="de-DE" dirty="0" smtClean="0"/>
+              <a:t>Dokumente</a:t>
+            </a:r>
+          </a:p>
+          <a:p>
+            <a:pPr lvl="1"/>
+            <a:r>
+              <a:rPr lang="de-DE" dirty="0" smtClean="0"/>
+              <a:t>Projekt-Exposé</a:t>
+            </a:r>
+          </a:p>
+          <a:p>
+            <a:pPr lvl="1"/>
+            <a:r>
+              <a:rPr lang="de-DE" dirty="0" smtClean="0"/>
+              <a:t>Projektplan</a:t>
+            </a:r>
+          </a:p>
+          <a:p>
+            <a:pPr lvl="1"/>
+            <a:r>
+              <a:rPr lang="de-DE" dirty="0" smtClean="0"/>
+              <a:t>Lastenheft</a:t>
+            </a:r>
+          </a:p>
+          <a:p>
+            <a:pPr lvl="1"/>
+            <a:r>
+              <a:rPr lang="de-DE" dirty="0" smtClean="0"/>
+              <a:t>Glossar (Begriffsdefinitionen)</a:t>
+            </a:r>
+          </a:p>
+          <a:p>
+            <a:pPr lvl="1"/>
+            <a:r>
+              <a:rPr lang="de-DE" dirty="0" smtClean="0"/>
+              <a:t>Risikoanalyse</a:t>
+            </a:r>
+            <a:endParaRPr lang="de-DE" dirty="0" smtClean="0"/>
+          </a:p>
+          <a:p>
+            <a:pPr lvl="1"/>
+            <a:r>
+              <a:rPr lang="de-DE" dirty="0" smtClean="0"/>
+              <a:t>Szenarien</a:t>
+            </a:r>
+          </a:p>
+          <a:p>
+            <a:pPr lvl="1"/>
+            <a:r>
+              <a:rPr lang="de-DE" dirty="0" smtClean="0"/>
+              <a:t>Wirtschaftslichkeitsbetrachtung</a:t>
+            </a:r>
+            <a:endParaRPr lang="de-DE" dirty="0"/>
+          </a:p>
+        </p:txBody>
+      </p:sp>
+      <p:sp>
+        <p:nvSpPr>
+          <p:cNvPr id="2" name="Titel 1"/>
+          <p:cNvSpPr>
+            <a:spLocks noGrp="1"/>
+          </p:cNvSpPr>
+          <p:nvPr>
+            <p:ph type="title"/>
+          </p:nvPr>
+        </p:nvSpPr>
+        <p:spPr/>
+        <p:txBody>
+          <a:bodyPr/>
+          <a:lstStyle/>
+          <a:p>
+            <a:r>
+              <a:rPr lang="de-DE" dirty="0" smtClean="0"/>
+              <a:t>Aktuelle Ergebnisse</a:t>
+            </a:r>
+            <a:endParaRPr lang="de-DE" dirty="0"/>
+          </a:p>
+        </p:txBody>
+      </p:sp>
+      <p:sp>
+        <p:nvSpPr>
+          <p:cNvPr id="4" name="Datumsplatzhalter 3"/>
+          <p:cNvSpPr>
+            <a:spLocks noGrp="1"/>
+          </p:cNvSpPr>
+          <p:nvPr>
+            <p:ph type="dt" sz="half" idx="10"/>
+          </p:nvPr>
+        </p:nvSpPr>
+        <p:spPr/>
+        <p:txBody>
+          <a:bodyPr/>
+          <a:lstStyle/>
+          <a:p>
+            <a:r>
+              <a:rPr lang="de-DE" smtClean="0"/>
+              <a:t>21.04.2012</a:t>
+            </a:r>
+            <a:endParaRPr lang="de-DE" dirty="0"/>
+          </a:p>
+        </p:txBody>
+      </p:sp>
+      <p:sp>
+        <p:nvSpPr>
+          <p:cNvPr id="5" name="Foliennummernplatzhalter 4"/>
+          <p:cNvSpPr>
+            <a:spLocks noGrp="1"/>
+          </p:cNvSpPr>
+          <p:nvPr>
+            <p:ph type="sldNum" sz="quarter" idx="12"/>
+          </p:nvPr>
+        </p:nvSpPr>
+        <p:spPr/>
+        <p:txBody>
+          <a:bodyPr/>
+          <a:lstStyle/>
+          <a:p>
+            <a:fld id="{6C6AE60A-B69C-4790-82F7-3882EDF23186}" type="slidenum">
+              <a:rPr lang="de-DE" smtClean="0"/>
+              <a:pPr/>
+              <a:t>11</a:t>
+            </a:fld>
+            <a:endParaRPr lang="de-DE" dirty="0"/>
+          </a:p>
+        </p:txBody>
+      </p:sp>
+      <p:sp>
+        <p:nvSpPr>
+          <p:cNvPr id="6" name="Fußzeilenplatzhalter 5"/>
+          <p:cNvSpPr>
+            <a:spLocks noGrp="1"/>
+          </p:cNvSpPr>
+          <p:nvPr>
+            <p:ph type="ftr" sz="quarter" idx="11"/>
+          </p:nvPr>
+        </p:nvSpPr>
+        <p:spPr/>
+        <p:txBody>
+          <a:bodyPr/>
+          <a:lstStyle/>
+          <a:p>
+            <a:r>
+              <a:rPr lang="de-DE" smtClean="0"/>
+              <a:t>Eventalizer</a:t>
+            </a:r>
+            <a:endParaRPr lang="de-DE" dirty="0"/>
+          </a:p>
+        </p:txBody>
+      </p:sp>
+    </p:spTree>
+  </p:cSld>
+  <p:clrMapOvr>
+    <a:masterClrMapping/>
+  </p:clrMapOvr>
+  <p:timing>
+    <p:tnLst>
+      <p:par>
+        <p:cTn id="1" dur="indefinite" restart="never" nodeType="tmRoot"/>
+      </p:par>
+    </p:tnLst>
+  </p:timing>
+</p:sld>
+</file>
+
+<file path=ppt/slides/slide12.xml><?xml version="1.0" encoding="utf-8"?>
+<p:sld xmlns:a="http://schemas.openxmlformats.org/drawingml/2006/main" xmlns:r="http://schemas.openxmlformats.org/officeDocument/2006/relationships" xmlns:p="http://schemas.openxmlformats.org/presentationml/2006/main">
+  <p:cSld>
+    <p:spTree>
+      <p:nvGrpSpPr>
+        <p:cNvPr id="1" name=""/>
+        <p:cNvGrpSpPr/>
+        <p:nvPr/>
+      </p:nvGrpSpPr>
+      <p:grpSpPr>
+        <a:xfrm>
+          <a:off x="0" y="0"/>
+          <a:ext cx="0" cy="0"/>
+          <a:chOff x="0" y="0"/>
+          <a:chExt cx="0" cy="0"/>
+        </a:xfrm>
+      </p:grpSpPr>
+      <p:sp>
+        <p:nvSpPr>
+          <p:cNvPr id="7" name="Abgerundetes Rechteck 6"/>
+          <p:cNvSpPr/>
+          <p:nvPr/>
+        </p:nvSpPr>
+        <p:spPr>
+          <a:xfrm>
+            <a:off x="755576" y="3717032"/>
+            <a:ext cx="4752528" cy="504056"/>
+          </a:xfrm>
+          <a:prstGeom prst="roundRect">
+            <a:avLst/>
+          </a:prstGeom>
+          <a:solidFill>
+            <a:schemeClr val="accent1">
+              <a:lumMod val="20000"/>
+              <a:lumOff val="80000"/>
+            </a:schemeClr>
+          </a:solidFill>
+          <a:ln>
+            <a:solidFill>
+              <a:schemeClr val="accent1">
+                <a:lumMod val="20000"/>
+                <a:lumOff val="80000"/>
+              </a:schemeClr>
+            </a:solidFill>
+          </a:ln>
+        </p:spPr>
+        <p:style>
+          <a:lnRef idx="2">
+            <a:schemeClr val="accent1">
+              <a:shade val="50000"/>
+            </a:schemeClr>
+          </a:lnRef>
+          <a:fillRef idx="1">
+            <a:schemeClr val="accent1"/>
+          </a:fillRef>
+          <a:effectRef idx="0">
+            <a:schemeClr val="accent1"/>
+          </a:effectRef>
+          <a:fontRef idx="minor">
+            <a:schemeClr val="lt1"/>
+          </a:fontRef>
+        </p:style>
+        <p:txBody>
+          <a:bodyPr rtlCol="0" anchor="ctr"/>
+          <a:lstStyle/>
+          <a:p>
+            <a:pPr algn="ctr"/>
+            <a:endParaRPr lang="de-DE"/>
+          </a:p>
+        </p:txBody>
+      </p:sp>
+      <p:sp>
+        <p:nvSpPr>
+          <p:cNvPr id="3" name="Inhaltsplatzhalter 2"/>
+          <p:cNvSpPr>
+            <a:spLocks noGrp="1"/>
+          </p:cNvSpPr>
+          <p:nvPr>
+            <p:ph idx="1"/>
+          </p:nvPr>
+        </p:nvSpPr>
+        <p:spPr>
+          <a:xfrm>
+            <a:off x="457200" y="1600200"/>
+            <a:ext cx="8686800" cy="4525963"/>
+          </a:xfrm>
+        </p:spPr>
+        <p:txBody>
+          <a:bodyPr>
+            <a:noAutofit/>
+          </a:bodyPr>
+          <a:lstStyle/>
+          <a:p>
+            <a:r>
+              <a:rPr lang="de-DE" dirty="0" smtClean="0"/>
+              <a:t>Dokumente</a:t>
+            </a:r>
+          </a:p>
+          <a:p>
+            <a:pPr lvl="1"/>
+            <a:r>
+              <a:rPr lang="de-DE" dirty="0" smtClean="0"/>
+              <a:t>Projekt-Exposé</a:t>
+            </a:r>
+          </a:p>
+          <a:p>
+            <a:pPr lvl="1"/>
+            <a:r>
+              <a:rPr lang="de-DE" dirty="0" smtClean="0"/>
+              <a:t>Projektplan</a:t>
+            </a:r>
+          </a:p>
+          <a:p>
+            <a:pPr lvl="1"/>
+            <a:r>
+              <a:rPr lang="de-DE" dirty="0" smtClean="0"/>
+              <a:t>Lastenheft</a:t>
+            </a:r>
+          </a:p>
+          <a:p>
+            <a:pPr lvl="1"/>
+            <a:r>
+              <a:rPr lang="de-DE" dirty="0" smtClean="0"/>
+              <a:t>Glossar (Begriffsdefinitionen)</a:t>
+            </a:r>
+          </a:p>
+          <a:p>
+            <a:pPr lvl="1"/>
+            <a:r>
+              <a:rPr lang="de-DE" dirty="0" smtClean="0"/>
+              <a:t>Risikoanalyse</a:t>
+            </a:r>
+          </a:p>
+          <a:p>
+            <a:pPr lvl="1"/>
+            <a:r>
+              <a:rPr lang="de-DE" dirty="0" smtClean="0"/>
+              <a:t>Szenarien</a:t>
+            </a:r>
+          </a:p>
+          <a:p>
+            <a:pPr lvl="1"/>
+            <a:r>
+              <a:rPr lang="de-DE" dirty="0" smtClean="0"/>
+              <a:t>Wirtschaftslichkeitsbetrachtung</a:t>
+            </a:r>
+            <a:endParaRPr lang="de-DE" dirty="0"/>
+          </a:p>
+        </p:txBody>
+      </p:sp>
+      <p:sp>
+        <p:nvSpPr>
+          <p:cNvPr id="2" name="Titel 1"/>
+          <p:cNvSpPr>
+            <a:spLocks noGrp="1"/>
+          </p:cNvSpPr>
+          <p:nvPr>
+            <p:ph type="title"/>
+          </p:nvPr>
+        </p:nvSpPr>
+        <p:spPr/>
+        <p:txBody>
+          <a:bodyPr/>
+          <a:lstStyle/>
+          <a:p>
+            <a:r>
+              <a:rPr lang="de-DE" dirty="0" smtClean="0"/>
+              <a:t>Aktuelle Ergebnisse</a:t>
+            </a:r>
+            <a:endParaRPr lang="de-DE" dirty="0"/>
+          </a:p>
+        </p:txBody>
+      </p:sp>
+      <p:sp>
+        <p:nvSpPr>
+          <p:cNvPr id="4" name="Datumsplatzhalter 3"/>
+          <p:cNvSpPr>
+            <a:spLocks noGrp="1"/>
+          </p:cNvSpPr>
+          <p:nvPr>
+            <p:ph type="dt" sz="half" idx="10"/>
+          </p:nvPr>
+        </p:nvSpPr>
+        <p:spPr/>
+        <p:txBody>
+          <a:bodyPr/>
+          <a:lstStyle/>
+          <a:p>
+            <a:r>
+              <a:rPr lang="de-DE" smtClean="0"/>
+              <a:t>21.04.2012</a:t>
+            </a:r>
+            <a:endParaRPr lang="de-DE" dirty="0"/>
+          </a:p>
+        </p:txBody>
+      </p:sp>
+      <p:sp>
+        <p:nvSpPr>
+          <p:cNvPr id="5" name="Foliennummernplatzhalter 4"/>
+          <p:cNvSpPr>
+            <a:spLocks noGrp="1"/>
+          </p:cNvSpPr>
+          <p:nvPr>
+            <p:ph type="sldNum" sz="quarter" idx="12"/>
+          </p:nvPr>
+        </p:nvSpPr>
+        <p:spPr/>
+        <p:txBody>
+          <a:bodyPr/>
+          <a:lstStyle/>
+          <a:p>
+            <a:fld id="{6C6AE60A-B69C-4790-82F7-3882EDF23186}" type="slidenum">
+              <a:rPr lang="de-DE" smtClean="0"/>
+              <a:pPr/>
+              <a:t>12</a:t>
+            </a:fld>
+            <a:endParaRPr lang="de-DE" dirty="0"/>
+          </a:p>
+        </p:txBody>
+      </p:sp>
+      <p:sp>
+        <p:nvSpPr>
+          <p:cNvPr id="6" name="Fußzeilenplatzhalter 5"/>
+          <p:cNvSpPr>
+            <a:spLocks noGrp="1"/>
+          </p:cNvSpPr>
+          <p:nvPr>
+            <p:ph type="ftr" sz="quarter" idx="11"/>
+          </p:nvPr>
+        </p:nvSpPr>
+        <p:spPr/>
+        <p:txBody>
+          <a:bodyPr/>
+          <a:lstStyle/>
+          <a:p>
+            <a:r>
+              <a:rPr lang="de-DE" smtClean="0"/>
+              <a:t>Eventalizer</a:t>
+            </a:r>
+            <a:endParaRPr lang="de-DE" dirty="0"/>
+          </a:p>
+        </p:txBody>
+      </p:sp>
+    </p:spTree>
+  </p:cSld>
+  <p:clrMapOvr>
+    <a:masterClrMapping/>
+  </p:clrMapOvr>
+  <p:timing>
+    <p:tnLst>
+      <p:par>
+        <p:cTn id="1" dur="indefinite" restart="never" nodeType="tmRoot"/>
+      </p:par>
+    </p:tnLst>
+  </p:timing>
+</p:sld>
+</file>
+
+<file path=ppt/slides/slide13.xml><?xml version="1.0" encoding="utf-8"?>
+<p:sld xmlns:a="http://schemas.openxmlformats.org/drawingml/2006/main" xmlns:r="http://schemas.openxmlformats.org/officeDocument/2006/relationships" xmlns:p="http://schemas.openxmlformats.org/presentationml/2006/main">
+  <p:cSld>
+    <p:spTree>
+      <p:nvGrpSpPr>
+        <p:cNvPr id="1" name=""/>
+        <p:cNvGrpSpPr/>
+        <p:nvPr/>
+      </p:nvGrpSpPr>
+      <p:grpSpPr>
+        <a:xfrm>
+          <a:off x="0" y="0"/>
+          <a:ext cx="0" cy="0"/>
+          <a:chOff x="0" y="0"/>
+          <a:chExt cx="0" cy="0"/>
+        </a:xfrm>
+      </p:grpSpPr>
+      <p:sp>
+        <p:nvSpPr>
+          <p:cNvPr id="7" name="Abgerundetes Rechteck 6"/>
+          <p:cNvSpPr/>
+          <p:nvPr/>
+        </p:nvSpPr>
+        <p:spPr>
+          <a:xfrm>
+            <a:off x="755576" y="4725144"/>
+            <a:ext cx="4752528" cy="504056"/>
+          </a:xfrm>
+          <a:prstGeom prst="roundRect">
+            <a:avLst/>
+          </a:prstGeom>
+          <a:solidFill>
+            <a:schemeClr val="accent1">
+              <a:lumMod val="20000"/>
+              <a:lumOff val="80000"/>
+            </a:schemeClr>
+          </a:solidFill>
+          <a:ln>
+            <a:solidFill>
+              <a:schemeClr val="accent1">
+                <a:lumMod val="20000"/>
+                <a:lumOff val="80000"/>
+              </a:schemeClr>
+            </a:solidFill>
+          </a:ln>
+        </p:spPr>
+        <p:style>
+          <a:lnRef idx="2">
+            <a:schemeClr val="accent1">
+              <a:shade val="50000"/>
+            </a:schemeClr>
+          </a:lnRef>
+          <a:fillRef idx="1">
+            <a:schemeClr val="accent1"/>
+          </a:fillRef>
+          <a:effectRef idx="0">
+            <a:schemeClr val="accent1"/>
+          </a:effectRef>
+          <a:fontRef idx="minor">
+            <a:schemeClr val="lt1"/>
+          </a:fontRef>
+        </p:style>
+        <p:txBody>
+          <a:bodyPr rtlCol="0" anchor="ctr"/>
+          <a:lstStyle/>
+          <a:p>
+            <a:pPr algn="ctr"/>
+            <a:endParaRPr lang="de-DE"/>
+          </a:p>
+        </p:txBody>
+      </p:sp>
+      <p:sp>
+        <p:nvSpPr>
+          <p:cNvPr id="3" name="Inhaltsplatzhalter 2"/>
+          <p:cNvSpPr>
+            <a:spLocks noGrp="1"/>
+          </p:cNvSpPr>
+          <p:nvPr>
+            <p:ph idx="1"/>
+          </p:nvPr>
+        </p:nvSpPr>
+        <p:spPr>
+          <a:xfrm>
+            <a:off x="457200" y="1600200"/>
+            <a:ext cx="8686800" cy="4525963"/>
+          </a:xfrm>
+        </p:spPr>
+        <p:txBody>
+          <a:bodyPr>
+            <a:noAutofit/>
+          </a:bodyPr>
+          <a:lstStyle/>
+          <a:p>
+            <a:r>
+              <a:rPr lang="de-DE" dirty="0" smtClean="0"/>
+              <a:t>Dokumente</a:t>
+            </a:r>
+          </a:p>
+          <a:p>
+            <a:pPr lvl="1"/>
+            <a:r>
+              <a:rPr lang="de-DE" dirty="0" smtClean="0"/>
+              <a:t>Projekt-Exposé</a:t>
+            </a:r>
+          </a:p>
+          <a:p>
+            <a:pPr lvl="1"/>
+            <a:r>
+              <a:rPr lang="de-DE" dirty="0" smtClean="0"/>
+              <a:t>Projektplan</a:t>
+            </a:r>
+          </a:p>
+          <a:p>
+            <a:pPr lvl="1"/>
+            <a:r>
+              <a:rPr lang="de-DE" dirty="0" smtClean="0"/>
+              <a:t>Lastenheft</a:t>
+            </a:r>
+          </a:p>
+          <a:p>
+            <a:pPr lvl="1"/>
+            <a:r>
+              <a:rPr lang="de-DE" dirty="0" smtClean="0"/>
+              <a:t>Glossar (Begriffsdefinitionen)</a:t>
+            </a:r>
+          </a:p>
+          <a:p>
+            <a:pPr lvl="1"/>
+            <a:r>
+              <a:rPr lang="de-DE" dirty="0" smtClean="0"/>
+              <a:t>Risikoanalyse</a:t>
+            </a:r>
+          </a:p>
+          <a:p>
+            <a:pPr lvl="1"/>
+            <a:r>
+              <a:rPr lang="de-DE" dirty="0" smtClean="0"/>
+              <a:t>Szenarien</a:t>
+            </a:r>
+          </a:p>
+          <a:p>
+            <a:pPr lvl="1"/>
+            <a:r>
+              <a:rPr lang="de-DE" dirty="0" smtClean="0"/>
+              <a:t>Wirtschaftslichkeitsbetrachtung</a:t>
+            </a:r>
+            <a:endParaRPr lang="de-DE" dirty="0"/>
+          </a:p>
+        </p:txBody>
+      </p:sp>
+      <p:sp>
+        <p:nvSpPr>
+          <p:cNvPr id="2" name="Titel 1"/>
+          <p:cNvSpPr>
+            <a:spLocks noGrp="1"/>
+          </p:cNvSpPr>
+          <p:nvPr>
+            <p:ph type="title"/>
+          </p:nvPr>
+        </p:nvSpPr>
+        <p:spPr/>
+        <p:txBody>
+          <a:bodyPr/>
+          <a:lstStyle/>
+          <a:p>
+            <a:r>
+              <a:rPr lang="de-DE" dirty="0" smtClean="0"/>
+              <a:t>Aktuelle Ergebnisse</a:t>
+            </a:r>
+            <a:endParaRPr lang="de-DE" dirty="0"/>
+          </a:p>
+        </p:txBody>
+      </p:sp>
+      <p:sp>
+        <p:nvSpPr>
+          <p:cNvPr id="4" name="Datumsplatzhalter 3"/>
+          <p:cNvSpPr>
+            <a:spLocks noGrp="1"/>
+          </p:cNvSpPr>
+          <p:nvPr>
+            <p:ph type="dt" sz="half" idx="10"/>
+          </p:nvPr>
+        </p:nvSpPr>
+        <p:spPr/>
+        <p:txBody>
+          <a:bodyPr/>
+          <a:lstStyle/>
+          <a:p>
+            <a:r>
+              <a:rPr lang="de-DE" smtClean="0"/>
+              <a:t>21.04.2012</a:t>
+            </a:r>
+            <a:endParaRPr lang="de-DE" dirty="0"/>
+          </a:p>
+        </p:txBody>
+      </p:sp>
+      <p:sp>
+        <p:nvSpPr>
+          <p:cNvPr id="5" name="Foliennummernplatzhalter 4"/>
+          <p:cNvSpPr>
+            <a:spLocks noGrp="1"/>
+          </p:cNvSpPr>
+          <p:nvPr>
+            <p:ph type="sldNum" sz="quarter" idx="12"/>
+          </p:nvPr>
+        </p:nvSpPr>
+        <p:spPr/>
+        <p:txBody>
+          <a:bodyPr/>
+          <a:lstStyle/>
+          <a:p>
+            <a:fld id="{6C6AE60A-B69C-4790-82F7-3882EDF23186}" type="slidenum">
+              <a:rPr lang="de-DE" smtClean="0"/>
+              <a:pPr/>
+              <a:t>13</a:t>
+            </a:fld>
+            <a:endParaRPr lang="de-DE" dirty="0"/>
+          </a:p>
+        </p:txBody>
+      </p:sp>
+      <p:sp>
+        <p:nvSpPr>
+          <p:cNvPr id="6" name="Fußzeilenplatzhalter 5"/>
+          <p:cNvSpPr>
+            <a:spLocks noGrp="1"/>
+          </p:cNvSpPr>
+          <p:nvPr>
+            <p:ph type="ftr" sz="quarter" idx="11"/>
+          </p:nvPr>
+        </p:nvSpPr>
+        <p:spPr/>
+        <p:txBody>
+          <a:bodyPr/>
+          <a:lstStyle/>
+          <a:p>
+            <a:r>
+              <a:rPr lang="de-DE" smtClean="0"/>
+              <a:t>Eventalizer</a:t>
+            </a:r>
+            <a:endParaRPr lang="de-DE" dirty="0"/>
+          </a:p>
+        </p:txBody>
+      </p:sp>
+    </p:spTree>
+  </p:cSld>
+  <p:clrMapOvr>
+    <a:masterClrMapping/>
+  </p:clrMapOvr>
+  <p:timing>
+    <p:tnLst>
+      <p:par>
+        <p:cTn id="1" dur="indefinite" restart="never" nodeType="tmRoot"/>
+      </p:par>
+    </p:tnLst>
+  </p:timing>
+</p:sld>
+</file>
+
+<file path=ppt/slides/slide14.xml><?xml version="1.0" encoding="utf-8"?>
+<p:sld xmlns:a="http://schemas.openxmlformats.org/drawingml/2006/main" xmlns:r="http://schemas.openxmlformats.org/officeDocument/2006/relationships" xmlns:p="http://schemas.openxmlformats.org/presentationml/2006/main">
+  <p:cSld>
+    <p:spTree>
+      <p:nvGrpSpPr>
+        <p:cNvPr id="1" name=""/>
+        <p:cNvGrpSpPr/>
+        <p:nvPr/>
+      </p:nvGrpSpPr>
+      <p:grpSpPr>
+        <a:xfrm>
+          <a:off x="0" y="0"/>
+          <a:ext cx="0" cy="0"/>
+          <a:chOff x="0" y="0"/>
+          <a:chExt cx="0" cy="0"/>
+        </a:xfrm>
+      </p:grpSpPr>
+      <p:sp>
+        <p:nvSpPr>
+          <p:cNvPr id="7" name="Abgerundetes Rechteck 6"/>
+          <p:cNvSpPr/>
+          <p:nvPr/>
+        </p:nvSpPr>
+        <p:spPr>
+          <a:xfrm>
+            <a:off x="755576" y="1628800"/>
+            <a:ext cx="4752528" cy="504056"/>
+          </a:xfrm>
+          <a:prstGeom prst="roundRect">
+            <a:avLst/>
+          </a:prstGeom>
+          <a:solidFill>
+            <a:schemeClr val="accent1">
+              <a:lumMod val="20000"/>
+              <a:lumOff val="80000"/>
+            </a:schemeClr>
+          </a:solidFill>
+          <a:ln>
+            <a:solidFill>
+              <a:schemeClr val="accent1">
+                <a:lumMod val="20000"/>
+                <a:lumOff val="80000"/>
+              </a:schemeClr>
+            </a:solidFill>
+          </a:ln>
+        </p:spPr>
+        <p:style>
+          <a:lnRef idx="2">
+            <a:schemeClr val="accent1">
+              <a:shade val="50000"/>
+            </a:schemeClr>
+          </a:lnRef>
+          <a:fillRef idx="1">
+            <a:schemeClr val="accent1"/>
+          </a:fillRef>
+          <a:effectRef idx="0">
+            <a:schemeClr val="accent1"/>
+          </a:effectRef>
+          <a:fontRef idx="minor">
+            <a:schemeClr val="lt1"/>
+          </a:fontRef>
+        </p:style>
+        <p:txBody>
+          <a:bodyPr rtlCol="0" anchor="ctr"/>
+          <a:lstStyle/>
+          <a:p>
+            <a:pPr algn="ctr"/>
+            <a:endParaRPr lang="de-DE"/>
+          </a:p>
+        </p:txBody>
+      </p:sp>
+      <p:sp>
+        <p:nvSpPr>
+          <p:cNvPr id="3" name="Inhaltsplatzhalter 2"/>
+          <p:cNvSpPr>
+            <a:spLocks noGrp="1"/>
+          </p:cNvSpPr>
+          <p:nvPr>
+            <p:ph idx="1"/>
+          </p:nvPr>
+        </p:nvSpPr>
+        <p:spPr>
+          <a:xfrm>
+            <a:off x="457200" y="1600200"/>
+            <a:ext cx="8686800" cy="4525963"/>
+          </a:xfrm>
+        </p:spPr>
+        <p:txBody>
+          <a:bodyPr>
+            <a:noAutofit/>
+          </a:bodyPr>
+          <a:lstStyle/>
+          <a:p>
+            <a:r>
+              <a:rPr lang="de-DE" dirty="0" err="1" smtClean="0"/>
+              <a:t>Use</a:t>
+            </a:r>
+            <a:r>
+              <a:rPr lang="de-DE" dirty="0" smtClean="0"/>
+              <a:t>-Case-Modell</a:t>
+            </a:r>
+            <a:endParaRPr lang="de-DE" dirty="0" smtClean="0"/>
+          </a:p>
+        </p:txBody>
+      </p:sp>
+      <p:sp>
+        <p:nvSpPr>
+          <p:cNvPr id="2" name="Titel 1"/>
+          <p:cNvSpPr>
+            <a:spLocks noGrp="1"/>
+          </p:cNvSpPr>
+          <p:nvPr>
+            <p:ph type="title"/>
+          </p:nvPr>
+        </p:nvSpPr>
+        <p:spPr/>
+        <p:txBody>
+          <a:bodyPr/>
+          <a:lstStyle/>
+          <a:p>
+            <a:r>
+              <a:rPr lang="de-DE" dirty="0" smtClean="0"/>
+              <a:t>Aktuelle Ergebnisse</a:t>
+            </a:r>
+            <a:endParaRPr lang="de-DE" dirty="0"/>
+          </a:p>
+        </p:txBody>
+      </p:sp>
+      <p:sp>
+        <p:nvSpPr>
+          <p:cNvPr id="4" name="Datumsplatzhalter 3"/>
+          <p:cNvSpPr>
+            <a:spLocks noGrp="1"/>
+          </p:cNvSpPr>
+          <p:nvPr>
+            <p:ph type="dt" sz="half" idx="10"/>
+          </p:nvPr>
+        </p:nvSpPr>
+        <p:spPr/>
+        <p:txBody>
+          <a:bodyPr/>
+          <a:lstStyle/>
+          <a:p>
+            <a:r>
+              <a:rPr lang="de-DE" smtClean="0"/>
+              <a:t>21.04.2012</a:t>
+            </a:r>
+            <a:endParaRPr lang="de-DE" dirty="0"/>
+          </a:p>
+        </p:txBody>
+      </p:sp>
+      <p:sp>
+        <p:nvSpPr>
+          <p:cNvPr id="5" name="Foliennummernplatzhalter 4"/>
+          <p:cNvSpPr>
+            <a:spLocks noGrp="1"/>
+          </p:cNvSpPr>
+          <p:nvPr>
+            <p:ph type="sldNum" sz="quarter" idx="12"/>
+          </p:nvPr>
+        </p:nvSpPr>
+        <p:spPr/>
+        <p:txBody>
+          <a:bodyPr/>
+          <a:lstStyle/>
+          <a:p>
+            <a:fld id="{6C6AE60A-B69C-4790-82F7-3882EDF23186}" type="slidenum">
+              <a:rPr lang="de-DE" smtClean="0"/>
+              <a:pPr/>
+              <a:t>14</a:t>
+            </a:fld>
+            <a:endParaRPr lang="de-DE" dirty="0"/>
+          </a:p>
+        </p:txBody>
+      </p:sp>
+      <p:sp>
+        <p:nvSpPr>
+          <p:cNvPr id="6" name="Fußzeilenplatzhalter 5"/>
+          <p:cNvSpPr>
+            <a:spLocks noGrp="1"/>
+          </p:cNvSpPr>
+          <p:nvPr>
+            <p:ph type="ftr" sz="quarter" idx="11"/>
+          </p:nvPr>
+        </p:nvSpPr>
+        <p:spPr/>
+        <p:txBody>
+          <a:bodyPr/>
+          <a:lstStyle/>
+          <a:p>
+            <a:r>
+              <a:rPr lang="de-DE" smtClean="0"/>
+              <a:t>Eventalizer</a:t>
+            </a:r>
+            <a:endParaRPr lang="de-DE" dirty="0"/>
+          </a:p>
+        </p:txBody>
+      </p:sp>
+    </p:spTree>
+  </p:cSld>
+  <p:clrMapOvr>
+    <a:masterClrMapping/>
+  </p:clrMapOvr>
+  <p:timing>
+    <p:tnLst>
+      <p:par>
+        <p:cTn id="1" dur="indefinite" restart="never" nodeType="tmRoot"/>
+      </p:par>
+    </p:tnLst>
+  </p:timing>
+</p:sld>
+</file>
+
+<file path=ppt/slides/slide15.xml><?xml version="1.0" encoding="utf-8"?>
+<p:sld xmlns:a="http://schemas.openxmlformats.org/drawingml/2006/main" xmlns:r="http://schemas.openxmlformats.org/officeDocument/2006/relationships" xmlns:p="http://schemas.openxmlformats.org/presentationml/2006/main">
+  <p:cSld>
+    <p:spTree>
+      <p:nvGrpSpPr>
+        <p:cNvPr id="1" name=""/>
+        <p:cNvGrpSpPr/>
+        <p:nvPr/>
+      </p:nvGrpSpPr>
+      <p:grpSpPr>
+        <a:xfrm>
+          <a:off x="0" y="0"/>
+          <a:ext cx="0" cy="0"/>
+          <a:chOff x="0" y="0"/>
+          <a:chExt cx="0" cy="0"/>
+        </a:xfrm>
+      </p:grpSpPr>
+      <p:sp>
+        <p:nvSpPr>
+          <p:cNvPr id="7" name="Abgerundetes Rechteck 6"/>
+          <p:cNvSpPr/>
+          <p:nvPr/>
+        </p:nvSpPr>
+        <p:spPr>
+          <a:xfrm>
+            <a:off x="827584" y="1628800"/>
+            <a:ext cx="4752528" cy="504056"/>
+          </a:xfrm>
+          <a:prstGeom prst="roundRect">
+            <a:avLst/>
+          </a:prstGeom>
+          <a:solidFill>
+            <a:schemeClr val="accent1">
+              <a:lumMod val="20000"/>
+              <a:lumOff val="80000"/>
+            </a:schemeClr>
+          </a:solidFill>
+          <a:ln>
+            <a:solidFill>
+              <a:schemeClr val="accent1">
+                <a:lumMod val="20000"/>
+                <a:lumOff val="80000"/>
+              </a:schemeClr>
+            </a:solidFill>
+          </a:ln>
+        </p:spPr>
+        <p:style>
+          <a:lnRef idx="2">
+            <a:schemeClr val="accent1">
+              <a:shade val="50000"/>
+            </a:schemeClr>
+          </a:lnRef>
+          <a:fillRef idx="1">
+            <a:schemeClr val="accent1"/>
+          </a:fillRef>
+          <a:effectRef idx="0">
+            <a:schemeClr val="accent1"/>
+          </a:effectRef>
+          <a:fontRef idx="minor">
+            <a:schemeClr val="lt1"/>
+          </a:fontRef>
+        </p:style>
+        <p:txBody>
+          <a:bodyPr rtlCol="0" anchor="ctr"/>
+          <a:lstStyle/>
+          <a:p>
+            <a:pPr algn="ctr"/>
+            <a:endParaRPr lang="de-DE"/>
+          </a:p>
+        </p:txBody>
+      </p:sp>
+      <p:sp>
+        <p:nvSpPr>
+          <p:cNvPr id="2" name="Titel 1"/>
+          <p:cNvSpPr>
+            <a:spLocks noGrp="1"/>
+          </p:cNvSpPr>
+          <p:nvPr>
+            <p:ph type="title"/>
+          </p:nvPr>
+        </p:nvSpPr>
+        <p:spPr/>
+        <p:txBody>
+          <a:bodyPr/>
+          <a:lstStyle/>
+          <a:p>
+            <a:r>
+              <a:rPr lang="de-DE" dirty="0" smtClean="0"/>
+              <a:t>Aktuelle Ergebnisse</a:t>
+            </a:r>
+            <a:endParaRPr lang="de-DE" dirty="0"/>
+          </a:p>
+        </p:txBody>
+      </p:sp>
+      <p:sp>
+        <p:nvSpPr>
+          <p:cNvPr id="3" name="Inhaltsplatzhalter 2"/>
+          <p:cNvSpPr>
+            <a:spLocks noGrp="1"/>
+          </p:cNvSpPr>
+          <p:nvPr>
+            <p:ph idx="1"/>
+          </p:nvPr>
+        </p:nvSpPr>
+        <p:spPr>
+          <a:xfrm>
+            <a:off x="457200" y="1600200"/>
+            <a:ext cx="8686800" cy="4525963"/>
+          </a:xfrm>
+        </p:spPr>
+        <p:txBody>
+          <a:bodyPr>
+            <a:noAutofit/>
+          </a:bodyPr>
+          <a:lstStyle/>
+          <a:p>
+            <a:r>
+              <a:rPr lang="de-DE" dirty="0" smtClean="0"/>
+              <a:t>Live-Demo</a:t>
+            </a:r>
+            <a:endParaRPr lang="de-DE" dirty="0" smtClean="0"/>
+          </a:p>
+          <a:p>
+            <a:pPr lvl="1"/>
+            <a:r>
+              <a:rPr lang="de-DE" dirty="0" smtClean="0"/>
+              <a:t>Anwendung</a:t>
+            </a:r>
+          </a:p>
+          <a:p>
+            <a:pPr lvl="1"/>
+            <a:r>
+              <a:rPr lang="de-DE" dirty="0" smtClean="0"/>
+              <a:t>Implementierung	</a:t>
+            </a:r>
+            <a:endParaRPr lang="de-DE" dirty="0"/>
+          </a:p>
+        </p:txBody>
+      </p:sp>
+      <p:sp>
+        <p:nvSpPr>
+          <p:cNvPr id="4" name="Datumsplatzhalter 3"/>
+          <p:cNvSpPr>
+            <a:spLocks noGrp="1"/>
+          </p:cNvSpPr>
+          <p:nvPr>
+            <p:ph type="dt" sz="half" idx="10"/>
+          </p:nvPr>
+        </p:nvSpPr>
+        <p:spPr/>
+        <p:txBody>
+          <a:bodyPr/>
+          <a:lstStyle/>
+          <a:p>
+            <a:r>
+              <a:rPr lang="de-DE" smtClean="0"/>
+              <a:t>21.04.2012</a:t>
+            </a:r>
+            <a:endParaRPr lang="de-DE" dirty="0"/>
+          </a:p>
+        </p:txBody>
+      </p:sp>
+      <p:sp>
+        <p:nvSpPr>
+          <p:cNvPr id="5" name="Foliennummernplatzhalter 4"/>
+          <p:cNvSpPr>
+            <a:spLocks noGrp="1"/>
+          </p:cNvSpPr>
+          <p:nvPr>
+            <p:ph type="sldNum" sz="quarter" idx="12"/>
+          </p:nvPr>
+        </p:nvSpPr>
+        <p:spPr/>
+        <p:txBody>
+          <a:bodyPr/>
+          <a:lstStyle/>
+          <a:p>
+            <a:fld id="{6C6AE60A-B69C-4790-82F7-3882EDF23186}" type="slidenum">
+              <a:rPr lang="de-DE" smtClean="0"/>
+              <a:pPr/>
+              <a:t>15</a:t>
+            </a:fld>
+            <a:endParaRPr lang="de-DE" dirty="0"/>
+          </a:p>
+        </p:txBody>
+      </p:sp>
+      <p:sp>
+        <p:nvSpPr>
+          <p:cNvPr id="6" name="Fußzeilenplatzhalter 5"/>
+          <p:cNvSpPr>
+            <a:spLocks noGrp="1"/>
+          </p:cNvSpPr>
+          <p:nvPr>
+            <p:ph type="ftr" sz="quarter" idx="11"/>
+          </p:nvPr>
+        </p:nvSpPr>
+        <p:spPr/>
+        <p:txBody>
+          <a:bodyPr/>
+          <a:lstStyle/>
+          <a:p>
+            <a:r>
+              <a:rPr lang="de-DE" smtClean="0"/>
+              <a:t>Eventalizer</a:t>
+            </a:r>
+            <a:endParaRPr lang="de-DE" dirty="0"/>
+          </a:p>
+        </p:txBody>
+      </p:sp>
+    </p:spTree>
+  </p:cSld>
+  <p:clrMapOvr>
+    <a:masterClrMapping/>
+  </p:clrMapOvr>
+  <p:timing>
+    <p:tnLst>
+      <p:par>
+        <p:cTn id="1" dur="indefinite" restart="never" nodeType="tmRoot"/>
+      </p:par>
+    </p:tnLst>
+  </p:timing>
+</p:sld>
+</file>
+
 <file path=ppt/slides/slide2.xml><?xml version="1.0" encoding="utf-8"?>
 <p:sld xmlns:a="http://schemas.openxmlformats.org/drawingml/2006/main" xmlns:r="http://schemas.openxmlformats.org/officeDocument/2006/relationships" xmlns:p="http://schemas.openxmlformats.org/presentationml/2006/main">
   <p:cSld>
@@ -6729,20 +8164,17 @@
           </a:p>
           <a:p>
             <a:r>
-              <a:rPr lang="de-DE" smtClean="0"/>
-              <a:t>???Zwischenstandsfazit</a:t>
-            </a:r>
-            <a:r>
-              <a:rPr lang="de-DE" dirty="0" smtClean="0"/>
-              <a:t>??? </a:t>
-            </a:r>
-          </a:p>
-          <a:p>
-            <a:pPr lvl="1"/>
-            <a:endParaRPr lang="de-DE" dirty="0" smtClean="0"/>
-          </a:p>
-          <a:p>
-            <a:pPr lvl="1"/>
+              <a:rPr lang="de-DE" dirty="0" smtClean="0"/>
+              <a:t>???</a:t>
+            </a:r>
+            <a:r>
+              <a:rPr lang="de-DE" dirty="0" err="1" smtClean="0"/>
+              <a:t>Zwischenstandsfazit</a:t>
+            </a:r>
+            <a:r>
+              <a:rPr lang="de-DE" dirty="0" smtClean="0"/>
+              <a:t>???</a:t>
+            </a:r>
             <a:endParaRPr lang="de-DE" dirty="0"/>
           </a:p>
         </p:txBody>
@@ -7111,39 +8543,70 @@
             <p:ph idx="1"/>
           </p:nvPr>
         </p:nvSpPr>
-        <p:spPr/>
-        <p:txBody>
-          <a:bodyPr/>
-          <a:lstStyle/>
-          <a:p>
-            <a:r>
-              <a:rPr lang="de-DE" dirty="0" smtClean="0"/>
-              <a:t>2x </a:t>
-            </a:r>
-            <a:r>
-              <a:rPr lang="de-DE" smtClean="0"/>
-              <a:t>wöchentlich Projekttreffen</a:t>
+        <p:spPr>
+          <a:xfrm>
+            <a:off x="457200" y="1600200"/>
+            <a:ext cx="8219256" cy="4525963"/>
+          </a:xfrm>
+        </p:spPr>
+        <p:txBody>
+          <a:bodyPr>
+            <a:noAutofit/>
+          </a:bodyPr>
+          <a:lstStyle/>
+          <a:p>
+            <a:r>
+              <a:rPr lang="de-DE" dirty="0" smtClean="0"/>
+              <a:t>Wöchentliches </a:t>
+            </a:r>
+            <a:r>
+              <a:rPr lang="de-DE" dirty="0" smtClean="0"/>
+              <a:t>Jour </a:t>
+            </a:r>
+            <a:r>
+              <a:rPr lang="de-DE" dirty="0" smtClean="0"/>
+              <a:t>fixe</a:t>
+            </a:r>
+          </a:p>
+          <a:p>
+            <a:r>
+              <a:rPr lang="de-DE" dirty="0" smtClean="0"/>
+              <a:t>Bei Bedarf ein zusätzlicher Termin möglich</a:t>
+            </a:r>
+          </a:p>
+          <a:p>
+            <a:r>
+              <a:rPr lang="de-DE" dirty="0" smtClean="0"/>
+              <a:t>Auf- und Verteilung der </a:t>
+            </a:r>
+            <a:r>
+              <a:rPr lang="de-DE" dirty="0" smtClean="0"/>
+              <a:t>Aufgaben/-</a:t>
+            </a:r>
+            <a:r>
+              <a:rPr lang="de-DE" dirty="0" err="1" smtClean="0"/>
+              <a:t>pakete</a:t>
+            </a:r>
+            <a:r>
+              <a:rPr lang="de-DE" dirty="0" smtClean="0"/>
+              <a:t> </a:t>
+            </a:r>
+            <a:r>
+              <a:rPr lang="de-DE" dirty="0" smtClean="0"/>
+              <a:t>erfolgt generell wochenweise (bei bedarf tageweise</a:t>
+            </a:r>
+            <a:r>
+              <a:rPr lang="de-DE" dirty="0" smtClean="0"/>
+              <a:t>) und flexibel</a:t>
+            </a:r>
+          </a:p>
+          <a:p>
+            <a:pPr lvl="1"/>
+            <a:r>
+              <a:rPr lang="de-DE" dirty="0" smtClean="0"/>
+              <a:t>Transparenz und Nachverfolgung durch Dokumentation in einer Aufgabenliste</a:t>
             </a:r>
             <a:endParaRPr lang="de-DE" dirty="0" smtClean="0"/>
-          </a:p>
-          <a:p>
-            <a:r>
-              <a:rPr lang="de-DE" dirty="0" smtClean="0"/>
-              <a:t>Freies Repository </a:t>
-            </a:r>
-            <a:r>
-              <a:rPr lang="de-DE" dirty="0" err="1" smtClean="0"/>
-              <a:t>gitHub</a:t>
-            </a:r>
-            <a:endParaRPr lang="de-DE" dirty="0" smtClean="0"/>
-          </a:p>
-          <a:p>
-            <a:pPr lvl="1"/>
-            <a:r>
-              <a:rPr lang="de-DE" dirty="0" err="1" smtClean="0"/>
-              <a:t>Versionierung</a:t>
-            </a:r>
-            <a:endParaRPr lang="de-DE" dirty="0"/>
           </a:p>
         </p:txBody>
       </p:sp>
@@ -7244,6 +8707,180 @@
       </p:grpSpPr>
       <p:sp>
         <p:nvSpPr>
+          <p:cNvPr id="7" name="Inhaltsplatzhalter 2"/>
+          <p:cNvSpPr txBox="1">
+            <a:spLocks/>
+          </p:cNvSpPr>
+          <p:nvPr/>
+        </p:nvSpPr>
+        <p:spPr>
+          <a:xfrm>
+            <a:off x="457200" y="1600200"/>
+            <a:ext cx="8219256" cy="4525963"/>
+          </a:xfrm>
+          <a:prstGeom prst="rect">
+            <a:avLst/>
+          </a:prstGeom>
+        </p:spPr>
+        <p:txBody>
+          <a:bodyPr vert="horz" lIns="91440" tIns="45720" rIns="91440" bIns="45720" rtlCol="0">
+            <a:noAutofit/>
+          </a:bodyPr>
+          <a:lstStyle/>
+          <a:p>
+            <a:pPr marL="342900" lvl="0" indent="-342900">
+              <a:spcBef>
+                <a:spcPct val="20000"/>
+              </a:spcBef>
+              <a:buFont typeface="Arial" pitchFamily="34" charset="0"/>
+              <a:buChar char="•"/>
+            </a:pPr>
+            <a:r>
+              <a:rPr lang="de-DE" sz="3200" dirty="0" smtClean="0">
+                <a:solidFill>
+                  <a:prstClr val="black"/>
+                </a:solidFill>
+              </a:rPr>
+              <a:t>Versionierung der Dokumente &amp; des Quellcodes</a:t>
+            </a:r>
+          </a:p>
+          <a:p>
+            <a:pPr marL="742950" lvl="1" indent="-285750">
+              <a:spcBef>
+                <a:spcPct val="20000"/>
+              </a:spcBef>
+              <a:buFont typeface="Arial" pitchFamily="34" charset="0"/>
+              <a:buChar char="–"/>
+            </a:pPr>
+            <a:r>
+              <a:rPr lang="de-DE" sz="2800" dirty="0" smtClean="0">
+                <a:solidFill>
+                  <a:prstClr val="black"/>
+                </a:solidFill>
+              </a:rPr>
+              <a:t>Erste Dokumente über Google </a:t>
+            </a:r>
+            <a:r>
+              <a:rPr lang="de-DE" sz="2800" dirty="0" err="1" smtClean="0">
+                <a:solidFill>
+                  <a:prstClr val="black"/>
+                </a:solidFill>
+              </a:rPr>
+              <a:t>Docs</a:t>
+            </a:r>
+            <a:endParaRPr lang="de-DE" sz="2800" dirty="0" smtClean="0">
+              <a:solidFill>
+                <a:prstClr val="black"/>
+              </a:solidFill>
+            </a:endParaRPr>
+          </a:p>
+          <a:p>
+            <a:pPr marL="742950" lvl="1" indent="-285750">
+              <a:spcBef>
+                <a:spcPct val="20000"/>
+              </a:spcBef>
+              <a:buFont typeface="Arial" pitchFamily="34" charset="0"/>
+              <a:buChar char="–"/>
+            </a:pPr>
+            <a:r>
+              <a:rPr lang="de-DE" sz="2800" dirty="0" smtClean="0">
+                <a:solidFill>
+                  <a:prstClr val="black"/>
+                </a:solidFill>
+              </a:rPr>
+              <a:t>Spätere Entscheidung für Freies </a:t>
+            </a:r>
+            <a:r>
+              <a:rPr lang="de-DE" sz="2800" dirty="0" smtClean="0">
+                <a:solidFill>
+                  <a:prstClr val="black"/>
+                </a:solidFill>
+              </a:rPr>
+              <a:t>Repository </a:t>
+            </a:r>
+            <a:r>
+              <a:rPr lang="de-DE" sz="2800" b="1" dirty="0" err="1" smtClean="0">
+                <a:solidFill>
+                  <a:prstClr val="black"/>
+                </a:solidFill>
+              </a:rPr>
+              <a:t>gitHub</a:t>
+            </a:r>
+            <a:endParaRPr lang="de-DE" sz="2800" b="1" dirty="0" smtClean="0">
+              <a:solidFill>
+                <a:prstClr val="black"/>
+              </a:solidFill>
+            </a:endParaRPr>
+          </a:p>
+          <a:p>
+            <a:pPr marL="1143000" lvl="2" indent="-228600">
+              <a:spcBef>
+                <a:spcPct val="20000"/>
+              </a:spcBef>
+              <a:buFont typeface="Arial" pitchFamily="34" charset="0"/>
+              <a:buChar char="•"/>
+            </a:pPr>
+            <a:r>
+              <a:rPr lang="de-DE" sz="2400" dirty="0" smtClean="0">
+                <a:solidFill>
+                  <a:prstClr val="black"/>
+                </a:solidFill>
+              </a:rPr>
+              <a:t>webbasierter Hosting-Dienst für Open-Source-Software-Entwicklungsprojekte</a:t>
+            </a:r>
+          </a:p>
+          <a:p>
+            <a:pPr marL="1143000" lvl="2" indent="-228600">
+              <a:spcBef>
+                <a:spcPct val="20000"/>
+              </a:spcBef>
+              <a:buFont typeface="Arial" pitchFamily="34" charset="0"/>
+              <a:buChar char="•"/>
+            </a:pPr>
+            <a:r>
+              <a:rPr lang="de-DE" sz="2400" dirty="0" smtClean="0">
+                <a:solidFill>
+                  <a:prstClr val="black"/>
+                </a:solidFill>
+              </a:rPr>
+              <a:t>Verwendet das Versionsverwaltungssystem </a:t>
+            </a:r>
+            <a:r>
+              <a:rPr lang="de-DE" sz="2400" dirty="0" err="1" smtClean="0">
+                <a:solidFill>
+                  <a:prstClr val="black"/>
+                </a:solidFill>
+              </a:rPr>
+              <a:t>Git</a:t>
+            </a:r>
+            <a:r>
+              <a:rPr lang="de-DE" sz="2400" dirty="0" smtClean="0">
+                <a:solidFill>
+                  <a:prstClr val="black"/>
+                </a:solidFill>
+              </a:rPr>
+              <a:t/>
+            </a:r>
+            <a:br>
+              <a:rPr lang="de-DE" sz="2400" dirty="0" smtClean="0">
+                <a:solidFill>
+                  <a:prstClr val="black"/>
+                </a:solidFill>
+              </a:rPr>
+            </a:br>
+            <a:r>
+              <a:rPr lang="de-DE" sz="2400" dirty="0" smtClean="0">
+                <a:solidFill>
+                  <a:prstClr val="black"/>
+                </a:solidFill>
+              </a:rPr>
+              <a:t>(freie Software zur verteilten Versionsverwaltung)</a:t>
+            </a:r>
+          </a:p>
+        </p:txBody>
+      </p:sp>
+      <p:sp>
+        <p:nvSpPr>
           <p:cNvPr id="2" name="Titel 1"/>
           <p:cNvSpPr>
             <a:spLocks noGrp="1"/>
@@ -7259,61 +8896,8 @@
           <a:p>
             <a:r>
               <a:rPr lang="de-DE" dirty="0" smtClean="0"/>
-              <a:t>Architekturentscheidungen</a:t>
-            </a:r>
-            <a:endParaRPr lang="de-DE" dirty="0"/>
-          </a:p>
-        </p:txBody>
-      </p:sp>
-      <p:sp>
-        <p:nvSpPr>
-          <p:cNvPr id="3" name="Inhaltsplatzhalter 2"/>
-          <p:cNvSpPr>
-            <a:spLocks noGrp="1"/>
-          </p:cNvSpPr>
-          <p:nvPr>
-            <p:ph idx="1"/>
-          </p:nvPr>
-        </p:nvSpPr>
-        <p:spPr/>
-        <p:txBody>
-          <a:bodyPr/>
-          <a:lstStyle/>
-          <a:p>
-            <a:r>
-              <a:rPr lang="de-DE" dirty="0" smtClean="0"/>
-              <a:t>Spring</a:t>
-            </a:r>
-          </a:p>
-          <a:p>
-            <a:pPr lvl="1"/>
-            <a:r>
-              <a:rPr lang="de-DE" dirty="0" smtClean="0"/>
-              <a:t>Warum Spring-</a:t>
-            </a:r>
-            <a:r>
-              <a:rPr lang="de-DE" dirty="0" err="1" smtClean="0"/>
-              <a:t>Roo</a:t>
-            </a:r>
-            <a:r>
-              <a:rPr lang="de-DE" dirty="0" smtClean="0"/>
-              <a:t> (Kurze Vorstellung?)</a:t>
-            </a:r>
-          </a:p>
-          <a:p>
-            <a:r>
-              <a:rPr lang="de-DE" dirty="0" err="1" smtClean="0"/>
-              <a:t>Hibernate</a:t>
-            </a:r>
-            <a:endParaRPr lang="de-DE" dirty="0" smtClean="0"/>
-          </a:p>
-          <a:p>
-            <a:r>
-              <a:rPr lang="de-DE" dirty="0" smtClean="0"/>
-              <a:t>Apache</a:t>
-            </a:r>
-          </a:p>
-          <a:p>
+              <a:t>Projektorganisation</a:t>
+            </a:r>
             <a:endParaRPr lang="de-DE" dirty="0"/>
           </a:p>
         </p:txBody>
@@ -7430,7 +9014,7 @@
           <a:p>
             <a:r>
               <a:rPr lang="de-DE" dirty="0" smtClean="0"/>
-              <a:t>Projektvorgehen</a:t>
+              <a:t>Architekturentscheidungen</a:t>
             </a:r>
             <a:endParaRPr lang="de-DE" dirty="0"/>
           </a:p>
@@ -7448,16 +9032,18 @@
         </p:nvSpPr>
         <p:spPr/>
         <p:txBody>
-          <a:bodyPr/>
-          <a:lstStyle/>
-          <a:p>
-            <a:r>
-              <a:rPr lang="de-DE" dirty="0" smtClean="0"/>
-              <a:t>Rational Unified </a:t>
+          <a:bodyPr>
+            <a:noAutofit/>
+          </a:bodyPr>
+          <a:lstStyle/>
+          <a:p>
+            <a:r>
+              <a:rPr lang="de-DE" dirty="0" smtClean="0"/>
+              <a:t>Spring </a:t>
             </a:r>
             <a:r>
               <a:rPr lang="de-DE" dirty="0" err="1" smtClean="0"/>
-              <a:t>Process</a:t>
+              <a:t>Roo</a:t>
             </a:r>
             <a:endParaRPr lang="de-DE" dirty="0" smtClean="0"/>
           </a:p>
@@ -7465,54 +9051,66 @@
             <a:pPr lvl="1"/>
             <a:r>
               <a:rPr lang="de-DE" dirty="0" smtClean="0"/>
-              <a:t>Iterativ</a:t>
+              <a:t>Werkzeug zur einfachen und effizienten Realisierung von Java-Anwendungen</a:t>
             </a:r>
           </a:p>
           <a:p>
             <a:pPr lvl="1"/>
             <a:r>
               <a:rPr lang="de-DE" dirty="0" smtClean="0"/>
-              <a:t>Inkrementell</a:t>
-            </a:r>
-          </a:p>
-          <a:p>
-            <a:r>
-              <a:rPr lang="de-DE" dirty="0" smtClean="0"/>
-              <a:t>Zeitlinie</a:t>
-            </a:r>
+              <a:t>Verwendung von </a:t>
+            </a:r>
+            <a:r>
+              <a:rPr lang="de-DE" dirty="0" smtClean="0"/>
+              <a:t>bekannten </a:t>
+            </a:r>
+            <a:r>
+              <a:rPr lang="de-DE" dirty="0" smtClean="0"/>
+              <a:t>und verbreiteten Java-Techniken wie Spring, dem Java </a:t>
+            </a:r>
+            <a:r>
+              <a:rPr lang="de-DE" dirty="0" err="1" smtClean="0"/>
+              <a:t>Persistence</a:t>
+            </a:r>
+            <a:r>
+              <a:rPr lang="de-DE" dirty="0" smtClean="0"/>
+              <a:t> API (JPA), </a:t>
+            </a:r>
+            <a:r>
+              <a:rPr lang="de-DE" dirty="0" err="1" smtClean="0"/>
+              <a:t>JUnit</a:t>
+            </a:r>
+            <a:r>
+              <a:rPr lang="de-DE" dirty="0" smtClean="0"/>
+              <a:t> oder Googles Web </a:t>
+            </a:r>
+            <a:r>
+              <a:rPr lang="de-DE" dirty="0" err="1" smtClean="0"/>
+              <a:t>Toolkit</a:t>
+            </a:r>
+            <a:r>
+              <a:rPr lang="de-DE" dirty="0" smtClean="0"/>
+              <a:t> (</a:t>
+            </a:r>
+            <a:r>
+              <a:rPr lang="de-DE" dirty="0" smtClean="0"/>
+              <a:t>GWT)</a:t>
+            </a:r>
+            <a:endParaRPr lang="de-DE" dirty="0" smtClean="0"/>
           </a:p>
           <a:p>
             <a:pPr lvl="1"/>
             <a:r>
               <a:rPr lang="de-DE" dirty="0" smtClean="0"/>
-              <a:t>Zeitraum 21.03. - 11.06.2012</a:t>
-            </a:r>
-          </a:p>
-          <a:p>
-            <a:pPr lvl="1"/>
+              <a:t>Konzentration auf den Entwicklungsprozess und nicht auf die Implementierung</a:t>
+            </a:r>
             <a:endParaRPr lang="de-DE" dirty="0" smtClean="0"/>
           </a:p>
         </p:txBody>
       </p:sp>
-      <p:graphicFrame>
-        <p:nvGraphicFramePr>
-          <p:cNvPr id="5" name="Diagramm 4"/>
-          <p:cNvGraphicFramePr/>
-          <p:nvPr/>
-        </p:nvGraphicFramePr>
-        <p:xfrm>
-          <a:off x="6444208" y="1556792"/>
-          <a:ext cx="2016224" cy="5040560"/>
-        </p:xfrm>
-        <a:graphic>
-          <a:graphicData uri="http://schemas.openxmlformats.org/drawingml/2006/diagram">
-            <dgm:relIds xmlns:dgm="http://schemas.openxmlformats.org/drawingml/2006/diagram" xmlns:r="http://schemas.openxmlformats.org/officeDocument/2006/relationships" r:dm="rId2" r:lo="rId3" r:qs="rId4" r:cs="rId5"/>
-          </a:graphicData>
-        </a:graphic>
-      </p:graphicFrame>
-      <p:sp>
-        <p:nvSpPr>
-          <p:cNvPr id="6" name="Datumsplatzhalter 5"/>
+      <p:sp>
+        <p:nvSpPr>
+          <p:cNvPr id="4" name="Datumsplatzhalter 3"/>
           <p:cNvSpPr>
             <a:spLocks noGrp="1"/>
           </p:cNvSpPr>
@@ -7535,7 +9133,30 @@
       </p:sp>
       <p:sp>
         <p:nvSpPr>
-          <p:cNvPr id="7" name="Foliennummernplatzhalter 6"/>
+          <p:cNvPr id="5" name="Fußzeilenplatzhalter 4"/>
+          <p:cNvSpPr>
+            <a:spLocks noGrp="1"/>
+          </p:cNvSpPr>
+          <p:nvPr>
+            <p:ph type="ftr" sz="quarter" idx="11"/>
+          </p:nvPr>
+        </p:nvSpPr>
+        <p:spPr/>
+        <p:txBody>
+          <a:bodyPr/>
+          <a:lstStyle/>
+          <a:p>
+            <a:r>
+              <a:rPr lang="de-DE" smtClean="0"/>
+              <a:t>Eventalizer</a:t>
+            </a:r>
+            <a:endParaRPr lang="de-DE" dirty="0"/>
+          </a:p>
+        </p:txBody>
+      </p:sp>
+      <p:sp>
+        <p:nvSpPr>
+          <p:cNvPr id="6" name="Foliennummernplatzhalter 5"/>
           <p:cNvSpPr>
             <a:spLocks noGrp="1"/>
           </p:cNvSpPr>
@@ -7553,29 +9174,6 @@
               <a:pPr/>
               <a:t>6</a:t>
             </a:fld>
-            <a:endParaRPr lang="de-DE" dirty="0"/>
-          </a:p>
-        </p:txBody>
-      </p:sp>
-      <p:sp>
-        <p:nvSpPr>
-          <p:cNvPr id="8" name="Fußzeilenplatzhalter 7"/>
-          <p:cNvSpPr>
-            <a:spLocks noGrp="1"/>
-          </p:cNvSpPr>
-          <p:nvPr>
-            <p:ph type="ftr" sz="quarter" idx="11"/>
-          </p:nvPr>
-        </p:nvSpPr>
-        <p:spPr/>
-        <p:txBody>
-          <a:bodyPr/>
-          <a:lstStyle/>
-          <a:p>
-            <a:r>
-              <a:rPr lang="de-DE" smtClean="0"/>
-              <a:t>Eventalizer</a:t>
-            </a:r>
             <a:endParaRPr lang="de-DE" dirty="0"/>
           </a:p>
         </p:txBody>
@@ -7622,7 +9220,7 @@
           <a:p>
             <a:r>
               <a:rPr lang="de-DE" dirty="0" smtClean="0"/>
-              <a:t>Aktuelle Ergebnisse</a:t>
+              <a:t>Architekturentscheidungen</a:t>
             </a:r>
             <a:endParaRPr lang="de-DE" dirty="0"/>
           </a:p>
@@ -7640,42 +9238,81 @@
         </p:nvSpPr>
         <p:spPr/>
         <p:txBody>
-          <a:bodyPr/>
-          <a:lstStyle/>
-          <a:p>
-            <a:r>
-              <a:rPr lang="de-DE" dirty="0" smtClean="0"/>
-              <a:t>Szenarien</a:t>
-            </a:r>
-          </a:p>
+          <a:bodyPr>
+            <a:noAutofit/>
+          </a:bodyPr>
+          <a:lstStyle/>
           <a:p>
             <a:r>
               <a:rPr lang="de-DE" dirty="0" err="1" smtClean="0"/>
-              <a:t>Use</a:t>
-            </a:r>
-            <a:r>
-              <a:rPr lang="de-DE" dirty="0" smtClean="0"/>
-              <a:t>-Case-Modell</a:t>
-            </a:r>
-          </a:p>
-          <a:p>
-            <a:r>
-              <a:rPr lang="de-DE" dirty="0" smtClean="0"/>
-              <a:t>Live-Demo</a:t>
-            </a:r>
+              <a:t>Hibernate</a:t>
+            </a:r>
+            <a:endParaRPr lang="de-DE" dirty="0" smtClean="0"/>
           </a:p>
           <a:p>
             <a:pPr lvl="1"/>
             <a:r>
               <a:rPr lang="de-DE" dirty="0" smtClean="0"/>
-              <a:t>Anwendung</a:t>
+              <a:t>Implementierung der Java </a:t>
+            </a:r>
+            <a:r>
+              <a:rPr lang="de-DE" dirty="0" err="1" smtClean="0"/>
+              <a:t>Persistence</a:t>
+            </a:r>
+            <a:r>
+              <a:rPr lang="de-DE" dirty="0" smtClean="0"/>
+              <a:t> API (JPA</a:t>
+            </a:r>
+            <a:r>
+              <a:rPr lang="de-DE" dirty="0" smtClean="0"/>
+              <a:t>)</a:t>
             </a:r>
           </a:p>
           <a:p>
             <a:pPr lvl="1"/>
             <a:r>
-              <a:rPr lang="de-DE" smtClean="0"/>
-              <a:t>Implementierung	</a:t>
+              <a:rPr lang="de-DE" dirty="0" err="1" smtClean="0"/>
+              <a:t>Object</a:t>
+            </a:r>
+            <a:r>
+              <a:rPr lang="de-DE" dirty="0" smtClean="0"/>
+              <a:t>-Relational Mapping (ORM)</a:t>
+            </a:r>
+          </a:p>
+          <a:p>
+            <a:pPr lvl="1"/>
+            <a:r>
+              <a:rPr lang="de-DE" dirty="0" smtClean="0"/>
+              <a:t>Weite Verbreitung</a:t>
+            </a:r>
+            <a:endParaRPr lang="de-DE" dirty="0" smtClean="0"/>
+          </a:p>
+          <a:p>
+            <a:r>
+              <a:rPr lang="de-DE" dirty="0" smtClean="0"/>
+              <a:t>Apache</a:t>
+            </a:r>
+            <a:endParaRPr lang="de-DE" dirty="0" smtClean="0"/>
+          </a:p>
+          <a:p>
+            <a:pPr lvl="1"/>
+            <a:r>
+              <a:rPr lang="de-DE" dirty="0" smtClean="0"/>
+              <a:t>Weit verbreitetester Web Server</a:t>
+            </a:r>
+          </a:p>
+          <a:p>
+            <a:pPr lvl="1"/>
+            <a:r>
+              <a:rPr lang="de-DE" dirty="0" smtClean="0"/>
+              <a:t>Open-Source</a:t>
+            </a:r>
+          </a:p>
+          <a:p>
+            <a:pPr lvl="1"/>
+            <a:r>
+              <a:rPr lang="de-DE" dirty="0" smtClean="0"/>
+              <a:t>Einfache Installation und Konfiguration</a:t>
             </a:r>
             <a:endParaRPr lang="de-DE" dirty="0"/>
           </a:p>
@@ -7706,7 +9343,30 @@
       </p:sp>
       <p:sp>
         <p:nvSpPr>
-          <p:cNvPr id="5" name="Foliennummernplatzhalter 4"/>
+          <p:cNvPr id="5" name="Fußzeilenplatzhalter 4"/>
+          <p:cNvSpPr>
+            <a:spLocks noGrp="1"/>
+          </p:cNvSpPr>
+          <p:nvPr>
+            <p:ph type="ftr" sz="quarter" idx="11"/>
+          </p:nvPr>
+        </p:nvSpPr>
+        <p:spPr/>
+        <p:txBody>
+          <a:bodyPr/>
+          <a:lstStyle/>
+          <a:p>
+            <a:r>
+              <a:rPr lang="de-DE" smtClean="0"/>
+              <a:t>Eventalizer</a:t>
+            </a:r>
+            <a:endParaRPr lang="de-DE" dirty="0"/>
+          </a:p>
+        </p:txBody>
+      </p:sp>
+      <p:sp>
+        <p:nvSpPr>
+          <p:cNvPr id="6" name="Foliennummernplatzhalter 5"/>
           <p:cNvSpPr>
             <a:spLocks noGrp="1"/>
           </p:cNvSpPr>
@@ -7724,29 +9384,6 @@
               <a:pPr/>
               <a:t>7</a:t>
             </a:fld>
-            <a:endParaRPr lang="de-DE" dirty="0"/>
-          </a:p>
-        </p:txBody>
-      </p:sp>
-      <p:sp>
-        <p:nvSpPr>
-          <p:cNvPr id="6" name="Fußzeilenplatzhalter 5"/>
-          <p:cNvSpPr>
-            <a:spLocks noGrp="1"/>
-          </p:cNvSpPr>
-          <p:nvPr>
-            <p:ph type="ftr" sz="quarter" idx="11"/>
-          </p:nvPr>
-        </p:nvSpPr>
-        <p:spPr/>
-        <p:txBody>
-          <a:bodyPr/>
-          <a:lstStyle/>
-          <a:p>
-            <a:r>
-              <a:rPr lang="de-DE" smtClean="0"/>
-              <a:t>Eventalizer</a:t>
-            </a:r>
             <a:endParaRPr lang="de-DE" dirty="0"/>
           </a:p>
         </p:txBody>
@@ -7756,6 +9393,432 @@
   <p:clrMapOvr>
     <a:masterClrMapping/>
   </p:clrMapOvr>
+</p:sld>
+</file>
+
+<file path=ppt/slides/slide8.xml><?xml version="1.0" encoding="utf-8"?>
+<p:sld xmlns:a="http://schemas.openxmlformats.org/drawingml/2006/main" xmlns:r="http://schemas.openxmlformats.org/officeDocument/2006/relationships" xmlns:p="http://schemas.openxmlformats.org/presentationml/2006/main">
+  <p:cSld>
+    <p:spTree>
+      <p:nvGrpSpPr>
+        <p:cNvPr id="1" name=""/>
+        <p:cNvGrpSpPr/>
+        <p:nvPr/>
+      </p:nvGrpSpPr>
+      <p:grpSpPr>
+        <a:xfrm>
+          <a:off x="0" y="0"/>
+          <a:ext cx="0" cy="0"/>
+          <a:chOff x="0" y="0"/>
+          <a:chExt cx="0" cy="0"/>
+        </a:xfrm>
+      </p:grpSpPr>
+      <p:sp>
+        <p:nvSpPr>
+          <p:cNvPr id="2" name="Titel 1"/>
+          <p:cNvSpPr>
+            <a:spLocks noGrp="1"/>
+          </p:cNvSpPr>
+          <p:nvPr>
+            <p:ph type="title"/>
+          </p:nvPr>
+        </p:nvSpPr>
+        <p:spPr/>
+        <p:txBody>
+          <a:bodyPr/>
+          <a:lstStyle/>
+          <a:p>
+            <a:r>
+              <a:rPr lang="de-DE" dirty="0" smtClean="0"/>
+              <a:t>Projektvorgehen</a:t>
+            </a:r>
+            <a:endParaRPr lang="de-DE" dirty="0"/>
+          </a:p>
+        </p:txBody>
+      </p:sp>
+      <p:sp>
+        <p:nvSpPr>
+          <p:cNvPr id="3" name="Inhaltsplatzhalter 2"/>
+          <p:cNvSpPr>
+            <a:spLocks noGrp="1"/>
+          </p:cNvSpPr>
+          <p:nvPr>
+            <p:ph idx="1"/>
+          </p:nvPr>
+        </p:nvSpPr>
+        <p:spPr/>
+        <p:txBody>
+          <a:bodyPr/>
+          <a:lstStyle/>
+          <a:p>
+            <a:r>
+              <a:rPr lang="de-DE" dirty="0" smtClean="0"/>
+              <a:t>Rational Unified </a:t>
+            </a:r>
+            <a:r>
+              <a:rPr lang="de-DE" dirty="0" err="1" smtClean="0"/>
+              <a:t>Process</a:t>
+            </a:r>
+            <a:r>
+              <a:rPr lang="de-DE" dirty="0" smtClean="0"/>
+              <a:t> (</a:t>
+            </a:r>
+            <a:r>
+              <a:rPr lang="de-DE" dirty="0" smtClean="0"/>
+              <a:t>RUP)</a:t>
+            </a:r>
+            <a:br>
+              <a:rPr lang="de-DE" dirty="0" smtClean="0"/>
+            </a:br>
+            <a:r>
+              <a:rPr lang="de-DE" dirty="0" smtClean="0"/>
+              <a:t>als Vorgehensmodell</a:t>
+            </a:r>
+            <a:endParaRPr lang="de-DE" dirty="0" smtClean="0"/>
+          </a:p>
+          <a:p>
+            <a:pPr lvl="1"/>
+            <a:r>
+              <a:rPr lang="de-DE" dirty="0" smtClean="0"/>
+              <a:t>Iterativ</a:t>
+            </a:r>
+          </a:p>
+          <a:p>
+            <a:pPr lvl="1"/>
+            <a:r>
+              <a:rPr lang="de-DE" dirty="0" smtClean="0"/>
+              <a:t>Inkrementell</a:t>
+            </a:r>
+          </a:p>
+          <a:p>
+            <a:pPr lvl="1"/>
+            <a:r>
+              <a:rPr lang="de-DE" dirty="0" smtClean="0"/>
+              <a:t>Unified Modeling Language </a:t>
+            </a:r>
+            <a:r>
+              <a:rPr lang="de-DE" dirty="0" smtClean="0"/>
+              <a:t/>
+            </a:r>
+            <a:br>
+              <a:rPr lang="de-DE" dirty="0" smtClean="0"/>
+            </a:br>
+            <a:r>
+              <a:rPr lang="de-DE" dirty="0" smtClean="0"/>
+              <a:t>(</a:t>
+            </a:r>
+            <a:r>
+              <a:rPr lang="de-DE" dirty="0" smtClean="0"/>
+              <a:t>UML</a:t>
+            </a:r>
+            <a:r>
+              <a:rPr lang="de-DE" dirty="0" smtClean="0"/>
+              <a:t>)</a:t>
+            </a:r>
+          </a:p>
+        </p:txBody>
+      </p:sp>
+      <p:graphicFrame>
+        <p:nvGraphicFramePr>
+          <p:cNvPr id="5" name="Diagramm 4"/>
+          <p:cNvGraphicFramePr/>
+          <p:nvPr/>
+        </p:nvGraphicFramePr>
+        <p:xfrm>
+          <a:off x="6444208" y="1196752"/>
+          <a:ext cx="2016224" cy="5040560"/>
+        </p:xfrm>
+        <a:graphic>
+          <a:graphicData uri="http://schemas.openxmlformats.org/drawingml/2006/diagram">
+            <dgm:relIds xmlns:dgm="http://schemas.openxmlformats.org/drawingml/2006/diagram" xmlns:r="http://schemas.openxmlformats.org/officeDocument/2006/relationships" r:dm="rId2" r:lo="rId3" r:qs="rId4" r:cs="rId5"/>
+          </a:graphicData>
+        </a:graphic>
+      </p:graphicFrame>
+      <p:sp>
+        <p:nvSpPr>
+          <p:cNvPr id="6" name="Datumsplatzhalter 5"/>
+          <p:cNvSpPr>
+            <a:spLocks noGrp="1"/>
+          </p:cNvSpPr>
+          <p:nvPr>
+            <p:ph type="dt" sz="half" idx="10"/>
+          </p:nvPr>
+        </p:nvSpPr>
+        <p:spPr/>
+        <p:txBody>
+          <a:bodyPr/>
+          <a:lstStyle/>
+          <a:p>
+            <a:r>
+              <a:rPr lang="de-DE" smtClean="0"/>
+              <a:t>21.04.2012</a:t>
+            </a:r>
+            <a:endParaRPr lang="de-DE" dirty="0"/>
+          </a:p>
+        </p:txBody>
+      </p:sp>
+      <p:sp>
+        <p:nvSpPr>
+          <p:cNvPr id="7" name="Foliennummernplatzhalter 6"/>
+          <p:cNvSpPr>
+            <a:spLocks noGrp="1"/>
+          </p:cNvSpPr>
+          <p:nvPr>
+            <p:ph type="sldNum" sz="quarter" idx="12"/>
+          </p:nvPr>
+        </p:nvSpPr>
+        <p:spPr/>
+        <p:txBody>
+          <a:bodyPr/>
+          <a:lstStyle/>
+          <a:p>
+            <a:fld id="{6C6AE60A-B69C-4790-82F7-3882EDF23186}" type="slidenum">
+              <a:rPr lang="de-DE" smtClean="0"/>
+              <a:pPr/>
+              <a:t>8</a:t>
+            </a:fld>
+            <a:endParaRPr lang="de-DE" dirty="0"/>
+          </a:p>
+        </p:txBody>
+      </p:sp>
+      <p:sp>
+        <p:nvSpPr>
+          <p:cNvPr id="8" name="Fußzeilenplatzhalter 7"/>
+          <p:cNvSpPr>
+            <a:spLocks noGrp="1"/>
+          </p:cNvSpPr>
+          <p:nvPr>
+            <p:ph type="ftr" sz="quarter" idx="11"/>
+          </p:nvPr>
+        </p:nvSpPr>
+        <p:spPr/>
+        <p:txBody>
+          <a:bodyPr/>
+          <a:lstStyle/>
+          <a:p>
+            <a:r>
+              <a:rPr lang="de-DE" smtClean="0"/>
+              <a:t>Eventalizer</a:t>
+            </a:r>
+            <a:endParaRPr lang="de-DE" dirty="0"/>
+          </a:p>
+        </p:txBody>
+      </p:sp>
+    </p:spTree>
+  </p:cSld>
+  <p:clrMapOvr>
+    <a:masterClrMapping/>
+  </p:clrMapOvr>
+  <p:timing>
+    <p:tnLst>
+      <p:par>
+        <p:cTn id="1" dur="indefinite" restart="never" nodeType="tmRoot"/>
+      </p:par>
+    </p:tnLst>
+  </p:timing>
+</p:sld>
+</file>
+
+<file path=ppt/slides/slide9.xml><?xml version="1.0" encoding="utf-8"?>
+<p:sld xmlns:a="http://schemas.openxmlformats.org/drawingml/2006/main" xmlns:r="http://schemas.openxmlformats.org/officeDocument/2006/relationships" xmlns:p="http://schemas.openxmlformats.org/presentationml/2006/main">
+  <p:cSld>
+    <p:spTree>
+      <p:nvGrpSpPr>
+        <p:cNvPr id="1" name=""/>
+        <p:cNvGrpSpPr/>
+        <p:nvPr/>
+      </p:nvGrpSpPr>
+      <p:grpSpPr>
+        <a:xfrm>
+          <a:off x="0" y="0"/>
+          <a:ext cx="0" cy="0"/>
+          <a:chOff x="0" y="0"/>
+          <a:chExt cx="0" cy="0"/>
+        </a:xfrm>
+      </p:grpSpPr>
+      <p:sp>
+        <p:nvSpPr>
+          <p:cNvPr id="2" name="Titel 1"/>
+          <p:cNvSpPr>
+            <a:spLocks noGrp="1"/>
+          </p:cNvSpPr>
+          <p:nvPr>
+            <p:ph type="title"/>
+          </p:nvPr>
+        </p:nvSpPr>
+        <p:spPr/>
+        <p:txBody>
+          <a:bodyPr/>
+          <a:lstStyle/>
+          <a:p>
+            <a:r>
+              <a:rPr lang="de-DE" dirty="0" smtClean="0"/>
+              <a:t>Projektvorgehen</a:t>
+            </a:r>
+            <a:endParaRPr lang="de-DE" dirty="0"/>
+          </a:p>
+        </p:txBody>
+      </p:sp>
+      <p:sp>
+        <p:nvSpPr>
+          <p:cNvPr id="3" name="Inhaltsplatzhalter 2"/>
+          <p:cNvSpPr>
+            <a:spLocks noGrp="1"/>
+          </p:cNvSpPr>
+          <p:nvPr>
+            <p:ph idx="1"/>
+          </p:nvPr>
+        </p:nvSpPr>
+        <p:spPr/>
+        <p:txBody>
+          <a:bodyPr>
+            <a:noAutofit/>
+          </a:bodyPr>
+          <a:lstStyle/>
+          <a:p>
+            <a:r>
+              <a:rPr lang="de-DE" dirty="0" smtClean="0"/>
+              <a:t>Zeitraum: 05.03.2012 </a:t>
+            </a:r>
+            <a:r>
+              <a:rPr lang="de-DE" dirty="0" smtClean="0"/>
+              <a:t>- </a:t>
+            </a:r>
+            <a:r>
+              <a:rPr lang="de-DE" dirty="0" smtClean="0"/>
+              <a:t>11.06.2012</a:t>
+            </a:r>
+          </a:p>
+          <a:p>
+            <a:r>
+              <a:rPr lang="de-DE" dirty="0" smtClean="0"/>
+              <a:t>Planung:</a:t>
+            </a:r>
+            <a:endParaRPr lang="de-DE" dirty="0" smtClean="0"/>
+          </a:p>
+          <a:p>
+            <a:pPr lvl="1"/>
+            <a:endParaRPr lang="de-DE" dirty="0" smtClean="0"/>
+          </a:p>
+        </p:txBody>
+      </p:sp>
+      <p:sp>
+        <p:nvSpPr>
+          <p:cNvPr id="6" name="Datumsplatzhalter 5"/>
+          <p:cNvSpPr>
+            <a:spLocks noGrp="1"/>
+          </p:cNvSpPr>
+          <p:nvPr>
+            <p:ph type="dt" sz="half" idx="10"/>
+          </p:nvPr>
+        </p:nvSpPr>
+        <p:spPr/>
+        <p:txBody>
+          <a:bodyPr/>
+          <a:lstStyle/>
+          <a:p>
+            <a:r>
+              <a:rPr lang="de-DE" smtClean="0"/>
+              <a:t>21.04.2012</a:t>
+            </a:r>
+            <a:endParaRPr lang="de-DE" dirty="0"/>
+          </a:p>
+        </p:txBody>
+      </p:sp>
+      <p:sp>
+        <p:nvSpPr>
+          <p:cNvPr id="7" name="Foliennummernplatzhalter 6"/>
+          <p:cNvSpPr>
+            <a:spLocks noGrp="1"/>
+          </p:cNvSpPr>
+          <p:nvPr>
+            <p:ph type="sldNum" sz="quarter" idx="12"/>
+          </p:nvPr>
+        </p:nvSpPr>
+        <p:spPr/>
+        <p:txBody>
+          <a:bodyPr/>
+          <a:lstStyle/>
+          <a:p>
+            <a:fld id="{6C6AE60A-B69C-4790-82F7-3882EDF23186}" type="slidenum">
+              <a:rPr lang="de-DE" smtClean="0"/>
+              <a:pPr/>
+              <a:t>9</a:t>
+            </a:fld>
+            <a:endParaRPr lang="de-DE" dirty="0"/>
+          </a:p>
+        </p:txBody>
+      </p:sp>
+      <p:sp>
+        <p:nvSpPr>
+          <p:cNvPr id="8" name="Fußzeilenplatzhalter 7"/>
+          <p:cNvSpPr>
+            <a:spLocks noGrp="1"/>
+          </p:cNvSpPr>
+          <p:nvPr>
+            <p:ph type="ftr" sz="quarter" idx="11"/>
+          </p:nvPr>
+        </p:nvSpPr>
+        <p:spPr/>
+        <p:txBody>
+          <a:bodyPr/>
+          <a:lstStyle/>
+          <a:p>
+            <a:r>
+              <a:rPr lang="de-DE" smtClean="0"/>
+              <a:t>Eventalizer</a:t>
+            </a:r>
+            <a:endParaRPr lang="de-DE" dirty="0"/>
+          </a:p>
+        </p:txBody>
+      </p:sp>
+      <p:pic>
+        <p:nvPicPr>
+          <p:cNvPr id="1029" name="Picture 5"/>
+          <p:cNvPicPr>
+            <a:picLocks noChangeAspect="1" noChangeArrowheads="1"/>
+          </p:cNvPicPr>
+          <p:nvPr/>
+        </p:nvPicPr>
+        <p:blipFill>
+          <a:blip r:embed="rId2" cstate="print"/>
+          <a:srcRect l="10164" r="51639" b="336"/>
+          <a:stretch>
+            <a:fillRect/>
+          </a:stretch>
+        </p:blipFill>
+        <p:spPr bwMode="auto">
+          <a:xfrm>
+            <a:off x="899592" y="2852936"/>
+            <a:ext cx="6705600" cy="2231896"/>
+          </a:xfrm>
+          <a:prstGeom prst="rect">
+            <a:avLst/>
+          </a:prstGeom>
+          <a:noFill/>
+          <a:ln w="9525">
+            <a:solidFill>
+              <a:schemeClr val="accent1"/>
+            </a:solidFill>
+            <a:miter lim="800000"/>
+            <a:headEnd/>
+            <a:tailEnd/>
+          </a:ln>
+          <a:effectLst/>
+        </p:spPr>
+      </p:pic>
+    </p:spTree>
+  </p:cSld>
+  <p:clrMapOvr>
+    <a:masterClrMapping/>
+  </p:clrMapOvr>
+  <p:timing>
+    <p:tnLst>
+      <p:par>
+        <p:cTn id="1" dur="indefinite" restart="never" nodeType="tmRoot"/>
+      </p:par>
+    </p:tnLst>
+  </p:timing>
 </p:sld>
 </file>
 

</xml_diff>

<commit_message>
Kleinere Änderungen Zwischenstandspräsi weitergemacht
</commit_message>
<xml_diff>
--- a/Dokumente/Zwischenstand zum 2012 04 21.pptx
+++ b/Dokumente/Zwischenstand zum 2012 04 21.pptx
@@ -5,7 +5,7 @@
     <p:sldMasterId id="2147483648" r:id="rId1"/>
   </p:sldMasterIdLst>
   <p:notesMasterIdLst>
-    <p:notesMasterId r:id="rId17"/>
+    <p:notesMasterId r:id="rId20"/>
   </p:notesMasterIdLst>
   <p:sldIdLst>
     <p:sldId id="256" r:id="rId2"/>
@@ -20,9 +20,12 @@
     <p:sldId id="260" r:id="rId11"/>
     <p:sldId id="267" r:id="rId12"/>
     <p:sldId id="268" r:id="rId13"/>
-    <p:sldId id="269" r:id="rId14"/>
-    <p:sldId id="266" r:id="rId15"/>
-    <p:sldId id="270" r:id="rId16"/>
+    <p:sldId id="273" r:id="rId14"/>
+    <p:sldId id="269" r:id="rId15"/>
+    <p:sldId id="271" r:id="rId16"/>
+    <p:sldId id="272" r:id="rId17"/>
+    <p:sldId id="266" r:id="rId18"/>
+    <p:sldId id="270" r:id="rId19"/>
   </p:sldIdLst>
   <p:sldSz cx="9144000" cy="6858000" type="screen4x3"/>
   <p:notesSz cx="6858000" cy="9144000"/>
@@ -3101,7 +3104,7 @@
             <a:fld id="{31195639-3003-43D9-AD76-FA6B58D41938}" type="datetimeFigureOut">
               <a:rPr lang="de-DE" smtClean="0"/>
               <a:pPr/>
-              <a:t>12.04.2012</a:t>
+              <a:t>14.04.2012</a:t>
             </a:fld>
             <a:endParaRPr lang="de-DE"/>
           </a:p>
@@ -6188,7 +6191,7 @@
             <a:lum/>
             <a:extLst>
               <a:ext uri="{28A0092B-C50C-407E-A947-70E740481C1C}">
-                <a14:useLocalDpi xmlns:ve="http://schemas.openxmlformats.org/markup-compatibility/2006" xmlns:m="http://schemas.openxmlformats.org/officeDocument/2006/math" xmlns:wp="http://schemas.openxmlformats.org/drawingml/2006/wordprocessingDrawing" xmlns:wne="http://schemas.microsoft.com/office/word/2006/wordml" xmlns="" xmlns:wpc="http://schemas.microsoft.com/office/word/2010/wordprocessingCanvas" xmlns:mc="http://schemas.openxmlformats.org/markup-compatibility/2006" xmlns:o="urn:schemas-microsoft-com:office:office" xmlns:v="urn:schemas-microsoft-com:vml" xmlns:wp14="http://schemas.microsoft.com/office/word/2010/wordprocessingDrawing" xmlns:w10="urn:schemas-microsoft-com:office:word" xmlns:w="http://schemas.openxmlformats.org/wordprocessingml/2006/main" xmlns:w14="http://schemas.microsoft.com/office/word/2010/wordml" xmlns:wpg="http://schemas.microsoft.com/office/word/2010/wordprocessingGroup" xmlns:wpi="http://schemas.microsoft.com/office/word/2010/wordprocessingInk" xmlns:wps="http://schemas.microsoft.com/office/word/2010/wordprocessingShape" xmlns:a14="http://schemas.microsoft.com/office/drawing/2010/main" xmlns:pic="http://schemas.openxmlformats.org/drawingml/2006/picture" xmlns:lc="http://schemas.openxmlformats.org/drawingml/2006/lockedCanvas" val="0"/>
+                <a14:useLocalDpi xmlns:lc="http://schemas.openxmlformats.org/drawingml/2006/lockedCanvas" xmlns:pic="http://schemas.openxmlformats.org/drawingml/2006/picture" xmlns:a14="http://schemas.microsoft.com/office/drawing/2010/main" xmlns:wps="http://schemas.microsoft.com/office/word/2010/wordprocessingShape" xmlns:wpi="http://schemas.microsoft.com/office/word/2010/wordprocessingInk" xmlns:wpg="http://schemas.microsoft.com/office/word/2010/wordprocessingGroup" xmlns:w14="http://schemas.microsoft.com/office/word/2010/wordml" xmlns:w="http://schemas.openxmlformats.org/wordprocessingml/2006/main" xmlns:w10="urn:schemas-microsoft-com:office:word" xmlns:wp14="http://schemas.microsoft.com/office/word/2010/wordprocessingDrawing" xmlns:v="urn:schemas-microsoft-com:vml" xmlns:o="urn:schemas-microsoft-com:office:office" xmlns:mc="http://schemas.openxmlformats.org/markup-compatibility/2006" xmlns:wpc="http://schemas.microsoft.com/office/word/2010/wordprocessingCanvas" xmlns="" xmlns:wne="http://schemas.microsoft.com/office/word/2006/wordml" xmlns:wp="http://schemas.openxmlformats.org/drawingml/2006/wordprocessingDrawing" xmlns:m="http://schemas.openxmlformats.org/officeDocument/2006/math" xmlns:ve="http://schemas.openxmlformats.org/markup-compatibility/2006" val="0"/>
               </a:ext>
             </a:extLst>
           </a:blip>
@@ -6989,7 +6992,6 @@
               <a:rPr lang="de-DE" dirty="0" smtClean="0"/>
               <a:t>Risikoanalyse</a:t>
             </a:r>
-            <a:endParaRPr lang="de-DE" dirty="0" smtClean="0"/>
           </a:p>
           <a:p>
             <a:pPr lvl="1"/>
@@ -7393,6 +7395,169 @@
       </p:grpSpPr>
       <p:sp>
         <p:nvSpPr>
+          <p:cNvPr id="2" name="Titel 1"/>
+          <p:cNvSpPr>
+            <a:spLocks noGrp="1"/>
+          </p:cNvSpPr>
+          <p:nvPr>
+            <p:ph type="title"/>
+          </p:nvPr>
+        </p:nvSpPr>
+        <p:spPr/>
+        <p:txBody>
+          <a:bodyPr>
+            <a:normAutofit fontScale="90000"/>
+          </a:bodyPr>
+          <a:lstStyle/>
+          <a:p>
+            <a:r>
+              <a:rPr lang="de-DE" dirty="0" smtClean="0"/>
+              <a:t>Glossar (Begriffsdefinitionen</a:t>
+            </a:r>
+            <a:r>
+              <a:rPr lang="de-DE" dirty="0" smtClean="0"/>
+              <a:t>)</a:t>
+            </a:r>
+            <a:endParaRPr lang="de-DE" dirty="0"/>
+          </a:p>
+        </p:txBody>
+      </p:sp>
+      <p:sp>
+        <p:nvSpPr>
+          <p:cNvPr id="4" name="Datumsplatzhalter 3"/>
+          <p:cNvSpPr>
+            <a:spLocks noGrp="1"/>
+          </p:cNvSpPr>
+          <p:nvPr>
+            <p:ph type="dt" sz="half" idx="10"/>
+          </p:nvPr>
+        </p:nvSpPr>
+        <p:spPr/>
+        <p:txBody>
+          <a:bodyPr/>
+          <a:lstStyle/>
+          <a:p>
+            <a:r>
+              <a:rPr lang="de-DE" smtClean="0"/>
+              <a:t>21.04.2012</a:t>
+            </a:r>
+            <a:endParaRPr lang="de-DE" dirty="0"/>
+          </a:p>
+        </p:txBody>
+      </p:sp>
+      <p:sp>
+        <p:nvSpPr>
+          <p:cNvPr id="5" name="Fußzeilenplatzhalter 4"/>
+          <p:cNvSpPr>
+            <a:spLocks noGrp="1"/>
+          </p:cNvSpPr>
+          <p:nvPr>
+            <p:ph type="ftr" sz="quarter" idx="11"/>
+          </p:nvPr>
+        </p:nvSpPr>
+        <p:spPr/>
+        <p:txBody>
+          <a:bodyPr/>
+          <a:lstStyle/>
+          <a:p>
+            <a:r>
+              <a:rPr lang="de-DE" smtClean="0"/>
+              <a:t>Eventalizer</a:t>
+            </a:r>
+            <a:endParaRPr lang="de-DE" dirty="0"/>
+          </a:p>
+        </p:txBody>
+      </p:sp>
+      <p:sp>
+        <p:nvSpPr>
+          <p:cNvPr id="6" name="Foliennummernplatzhalter 5"/>
+          <p:cNvSpPr>
+            <a:spLocks noGrp="1"/>
+          </p:cNvSpPr>
+          <p:nvPr>
+            <p:ph type="sldNum" sz="quarter" idx="12"/>
+          </p:nvPr>
+        </p:nvSpPr>
+        <p:spPr/>
+        <p:txBody>
+          <a:bodyPr/>
+          <a:lstStyle/>
+          <a:p>
+            <a:fld id="{6C6AE60A-B69C-4790-82F7-3882EDF23186}" type="slidenum">
+              <a:rPr lang="de-DE" smtClean="0"/>
+              <a:pPr/>
+              <a:t>13</a:t>
+            </a:fld>
+            <a:endParaRPr lang="de-DE" dirty="0"/>
+          </a:p>
+        </p:txBody>
+      </p:sp>
+      <p:pic>
+        <p:nvPicPr>
+          <p:cNvPr id="3073" name="Picture 1"/>
+          <p:cNvPicPr>
+            <a:picLocks noChangeAspect="1" noChangeArrowheads="1"/>
+          </p:cNvPicPr>
+          <p:nvPr/>
+        </p:nvPicPr>
+        <p:blipFill>
+          <a:blip r:embed="rId2" cstate="print"/>
+          <a:srcRect/>
+          <a:stretch>
+            <a:fillRect/>
+          </a:stretch>
+        </p:blipFill>
+        <p:spPr bwMode="auto">
+          <a:xfrm>
+            <a:off x="1849338" y="1603970"/>
+            <a:ext cx="5314950" cy="4705350"/>
+          </a:xfrm>
+          <a:prstGeom prst="rect">
+            <a:avLst/>
+          </a:prstGeom>
+          <a:noFill/>
+          <a:ln w="9525">
+            <a:noFill/>
+            <a:miter lim="800000"/>
+            <a:headEnd/>
+            <a:tailEnd/>
+          </a:ln>
+        </p:spPr>
+      </p:pic>
+    </p:spTree>
+  </p:cSld>
+  <p:clrMapOvr>
+    <a:masterClrMapping/>
+  </p:clrMapOvr>
+  <p:timing>
+    <p:tnLst>
+      <p:par>
+        <p:cTn id="1" dur="indefinite" restart="never" nodeType="tmRoot"/>
+      </p:par>
+    </p:tnLst>
+  </p:timing>
+</p:sld>
+</file>
+
+<file path=ppt/slides/slide14.xml><?xml version="1.0" encoding="utf-8"?>
+<p:sld xmlns:a="http://schemas.openxmlformats.org/drawingml/2006/main" xmlns:r="http://schemas.openxmlformats.org/officeDocument/2006/relationships" xmlns:p="http://schemas.openxmlformats.org/presentationml/2006/main">
+  <p:cSld>
+    <p:spTree>
+      <p:nvGrpSpPr>
+        <p:cNvPr id="1" name=""/>
+        <p:cNvGrpSpPr/>
+        <p:nvPr/>
+      </p:nvGrpSpPr>
+      <p:grpSpPr>
+        <a:xfrm>
+          <a:off x="0" y="0"/>
+          <a:ext cx="0" cy="0"/>
+          <a:chOff x="0" y="0"/>
+          <a:chExt cx="0" cy="0"/>
+        </a:xfrm>
+      </p:grpSpPr>
+      <p:sp>
+        <p:nvSpPr>
           <p:cNvPr id="7" name="Abgerundetes Rechteck 6"/>
           <p:cNvSpPr/>
           <p:nvPr/>
@@ -7588,7 +7753,7 @@
             <a:fld id="{6C6AE60A-B69C-4790-82F7-3882EDF23186}" type="slidenum">
               <a:rPr lang="de-DE" smtClean="0"/>
               <a:pPr/>
-              <a:t>13</a:t>
+              <a:t>14</a:t>
             </a:fld>
             <a:endParaRPr lang="de-DE" dirty="0"/>
           </a:p>
@@ -7632,7 +7797,325 @@
 </p:sld>
 </file>
 
-<file path=ppt/slides/slide14.xml><?xml version="1.0" encoding="utf-8"?>
+<file path=ppt/slides/slide15.xml><?xml version="1.0" encoding="utf-8"?>
+<p:sld xmlns:a="http://schemas.openxmlformats.org/drawingml/2006/main" xmlns:r="http://schemas.openxmlformats.org/officeDocument/2006/relationships" xmlns:p="http://schemas.openxmlformats.org/presentationml/2006/main">
+  <p:cSld>
+    <p:spTree>
+      <p:nvGrpSpPr>
+        <p:cNvPr id="1" name=""/>
+        <p:cNvGrpSpPr/>
+        <p:nvPr/>
+      </p:nvGrpSpPr>
+      <p:grpSpPr>
+        <a:xfrm>
+          <a:off x="0" y="0"/>
+          <a:ext cx="0" cy="0"/>
+          <a:chOff x="0" y="0"/>
+          <a:chExt cx="0" cy="0"/>
+        </a:xfrm>
+      </p:grpSpPr>
+      <p:sp>
+        <p:nvSpPr>
+          <p:cNvPr id="2" name="Titel 1"/>
+          <p:cNvSpPr>
+            <a:spLocks noGrp="1"/>
+          </p:cNvSpPr>
+          <p:nvPr>
+            <p:ph type="title"/>
+          </p:nvPr>
+        </p:nvSpPr>
+        <p:spPr/>
+        <p:txBody>
+          <a:bodyPr/>
+          <a:lstStyle/>
+          <a:p>
+            <a:r>
+              <a:rPr lang="de-DE" dirty="0" smtClean="0"/>
+              <a:t>Szenarien (1/2)</a:t>
+            </a:r>
+            <a:endParaRPr lang="de-DE" dirty="0"/>
+          </a:p>
+        </p:txBody>
+      </p:sp>
+      <p:sp>
+        <p:nvSpPr>
+          <p:cNvPr id="4" name="Datumsplatzhalter 3"/>
+          <p:cNvSpPr>
+            <a:spLocks noGrp="1"/>
+          </p:cNvSpPr>
+          <p:nvPr>
+            <p:ph type="dt" sz="half" idx="10"/>
+          </p:nvPr>
+        </p:nvSpPr>
+        <p:spPr/>
+        <p:txBody>
+          <a:bodyPr/>
+          <a:lstStyle/>
+          <a:p>
+            <a:r>
+              <a:rPr lang="de-DE" smtClean="0"/>
+              <a:t>21.04.2012</a:t>
+            </a:r>
+            <a:endParaRPr lang="de-DE" dirty="0"/>
+          </a:p>
+        </p:txBody>
+      </p:sp>
+      <p:sp>
+        <p:nvSpPr>
+          <p:cNvPr id="5" name="Fußzeilenplatzhalter 4"/>
+          <p:cNvSpPr>
+            <a:spLocks noGrp="1"/>
+          </p:cNvSpPr>
+          <p:nvPr>
+            <p:ph type="ftr" sz="quarter" idx="11"/>
+          </p:nvPr>
+        </p:nvSpPr>
+        <p:spPr/>
+        <p:txBody>
+          <a:bodyPr/>
+          <a:lstStyle/>
+          <a:p>
+            <a:r>
+              <a:rPr lang="de-DE" smtClean="0"/>
+              <a:t>Eventalizer</a:t>
+            </a:r>
+            <a:endParaRPr lang="de-DE" dirty="0"/>
+          </a:p>
+        </p:txBody>
+      </p:sp>
+      <p:sp>
+        <p:nvSpPr>
+          <p:cNvPr id="6" name="Foliennummernplatzhalter 5"/>
+          <p:cNvSpPr>
+            <a:spLocks noGrp="1"/>
+          </p:cNvSpPr>
+          <p:nvPr>
+            <p:ph type="sldNum" sz="quarter" idx="12"/>
+          </p:nvPr>
+        </p:nvSpPr>
+        <p:spPr/>
+        <p:txBody>
+          <a:bodyPr/>
+          <a:lstStyle/>
+          <a:p>
+            <a:fld id="{6C6AE60A-B69C-4790-82F7-3882EDF23186}" type="slidenum">
+              <a:rPr lang="de-DE" smtClean="0"/>
+              <a:pPr/>
+              <a:t>15</a:t>
+            </a:fld>
+            <a:endParaRPr lang="de-DE" dirty="0"/>
+          </a:p>
+        </p:txBody>
+      </p:sp>
+      <p:pic>
+        <p:nvPicPr>
+          <p:cNvPr id="1026" name="Picture 2"/>
+          <p:cNvPicPr>
+            <a:picLocks noChangeAspect="1" noChangeArrowheads="1"/>
+          </p:cNvPicPr>
+          <p:nvPr/>
+        </p:nvPicPr>
+        <p:blipFill>
+          <a:blip r:embed="rId2" cstate="print"/>
+          <a:srcRect/>
+          <a:stretch>
+            <a:fillRect/>
+          </a:stretch>
+        </p:blipFill>
+        <p:spPr bwMode="auto">
+          <a:xfrm>
+            <a:off x="1495003" y="1556792"/>
+            <a:ext cx="6029325" cy="4657725"/>
+          </a:xfrm>
+          <a:prstGeom prst="rect">
+            <a:avLst/>
+          </a:prstGeom>
+          <a:noFill/>
+          <a:ln w="9525">
+            <a:noFill/>
+            <a:miter lim="800000"/>
+            <a:headEnd/>
+            <a:tailEnd/>
+          </a:ln>
+        </p:spPr>
+      </p:pic>
+    </p:spTree>
+  </p:cSld>
+  <p:clrMapOvr>
+    <a:masterClrMapping/>
+  </p:clrMapOvr>
+  <p:timing>
+    <p:tnLst>
+      <p:par>
+        <p:cTn id="1" dur="indefinite" restart="never" nodeType="tmRoot"/>
+      </p:par>
+    </p:tnLst>
+  </p:timing>
+</p:sld>
+</file>
+
+<file path=ppt/slides/slide16.xml><?xml version="1.0" encoding="utf-8"?>
+<p:sld xmlns:a="http://schemas.openxmlformats.org/drawingml/2006/main" xmlns:r="http://schemas.openxmlformats.org/officeDocument/2006/relationships" xmlns:p="http://schemas.openxmlformats.org/presentationml/2006/main">
+  <p:cSld>
+    <p:spTree>
+      <p:nvGrpSpPr>
+        <p:cNvPr id="1" name=""/>
+        <p:cNvGrpSpPr/>
+        <p:nvPr/>
+      </p:nvGrpSpPr>
+      <p:grpSpPr>
+        <a:xfrm>
+          <a:off x="0" y="0"/>
+          <a:ext cx="0" cy="0"/>
+          <a:chOff x="0" y="0"/>
+          <a:chExt cx="0" cy="0"/>
+        </a:xfrm>
+      </p:grpSpPr>
+      <p:sp>
+        <p:nvSpPr>
+          <p:cNvPr id="2" name="Titel 1"/>
+          <p:cNvSpPr>
+            <a:spLocks noGrp="1"/>
+          </p:cNvSpPr>
+          <p:nvPr>
+            <p:ph type="title"/>
+          </p:nvPr>
+        </p:nvSpPr>
+        <p:spPr/>
+        <p:txBody>
+          <a:bodyPr/>
+          <a:lstStyle/>
+          <a:p>
+            <a:r>
+              <a:rPr lang="de-DE" dirty="0" smtClean="0"/>
+              <a:t>Szenarien (2/2</a:t>
+            </a:r>
+            <a:r>
+              <a:rPr lang="de-DE" dirty="0" smtClean="0"/>
+              <a:t>)</a:t>
+            </a:r>
+            <a:endParaRPr lang="de-DE" dirty="0"/>
+          </a:p>
+        </p:txBody>
+      </p:sp>
+      <p:sp>
+        <p:nvSpPr>
+          <p:cNvPr id="4" name="Datumsplatzhalter 3"/>
+          <p:cNvSpPr>
+            <a:spLocks noGrp="1"/>
+          </p:cNvSpPr>
+          <p:nvPr>
+            <p:ph type="dt" sz="half" idx="10"/>
+          </p:nvPr>
+        </p:nvSpPr>
+        <p:spPr/>
+        <p:txBody>
+          <a:bodyPr/>
+          <a:lstStyle/>
+          <a:p>
+            <a:r>
+              <a:rPr lang="de-DE" smtClean="0"/>
+              <a:t>21.04.2012</a:t>
+            </a:r>
+            <a:endParaRPr lang="de-DE" dirty="0"/>
+          </a:p>
+        </p:txBody>
+      </p:sp>
+      <p:sp>
+        <p:nvSpPr>
+          <p:cNvPr id="5" name="Fußzeilenplatzhalter 4"/>
+          <p:cNvSpPr>
+            <a:spLocks noGrp="1"/>
+          </p:cNvSpPr>
+          <p:nvPr>
+            <p:ph type="ftr" sz="quarter" idx="11"/>
+          </p:nvPr>
+        </p:nvSpPr>
+        <p:spPr/>
+        <p:txBody>
+          <a:bodyPr/>
+          <a:lstStyle/>
+          <a:p>
+            <a:r>
+              <a:rPr lang="de-DE" smtClean="0"/>
+              <a:t>Eventalizer</a:t>
+            </a:r>
+            <a:endParaRPr lang="de-DE" dirty="0"/>
+          </a:p>
+        </p:txBody>
+      </p:sp>
+      <p:sp>
+        <p:nvSpPr>
+          <p:cNvPr id="6" name="Foliennummernplatzhalter 5"/>
+          <p:cNvSpPr>
+            <a:spLocks noGrp="1"/>
+          </p:cNvSpPr>
+          <p:nvPr>
+            <p:ph type="sldNum" sz="quarter" idx="12"/>
+          </p:nvPr>
+        </p:nvSpPr>
+        <p:spPr/>
+        <p:txBody>
+          <a:bodyPr/>
+          <a:lstStyle/>
+          <a:p>
+            <a:fld id="{6C6AE60A-B69C-4790-82F7-3882EDF23186}" type="slidenum">
+              <a:rPr lang="de-DE" smtClean="0"/>
+              <a:pPr/>
+              <a:t>16</a:t>
+            </a:fld>
+            <a:endParaRPr lang="de-DE" dirty="0"/>
+          </a:p>
+        </p:txBody>
+      </p:sp>
+      <p:pic>
+        <p:nvPicPr>
+          <p:cNvPr id="2050" name="Picture 2"/>
+          <p:cNvPicPr>
+            <a:picLocks noChangeAspect="1" noChangeArrowheads="1"/>
+          </p:cNvPicPr>
+          <p:nvPr/>
+        </p:nvPicPr>
+        <p:blipFill>
+          <a:blip r:embed="rId2" cstate="print"/>
+          <a:srcRect/>
+          <a:stretch>
+            <a:fillRect/>
+          </a:stretch>
+        </p:blipFill>
+        <p:spPr bwMode="auto">
+          <a:xfrm>
+            <a:off x="1609303" y="1633686"/>
+            <a:ext cx="5915025" cy="4819650"/>
+          </a:xfrm>
+          <a:prstGeom prst="rect">
+            <a:avLst/>
+          </a:prstGeom>
+          <a:noFill/>
+          <a:ln w="9525">
+            <a:noFill/>
+            <a:miter lim="800000"/>
+            <a:headEnd/>
+            <a:tailEnd/>
+          </a:ln>
+        </p:spPr>
+      </p:pic>
+    </p:spTree>
+  </p:cSld>
+  <p:clrMapOvr>
+    <a:masterClrMapping/>
+  </p:clrMapOvr>
+  <p:timing>
+    <p:tnLst>
+      <p:par>
+        <p:cTn id="1" dur="indefinite" restart="never" nodeType="tmRoot"/>
+      </p:par>
+    </p:tnLst>
+  </p:timing>
+</p:sld>
+</file>
+
+<file path=ppt/slides/slide17.xml><?xml version="1.0" encoding="utf-8"?>
 <p:sld xmlns:a="http://schemas.openxmlformats.org/drawingml/2006/main" xmlns:r="http://schemas.openxmlformats.org/officeDocument/2006/relationships" xmlns:p="http://schemas.openxmlformats.org/presentationml/2006/main">
   <p:cSld>
     <p:spTree>
@@ -7733,7 +8216,6 @@
               <a:rPr lang="de-DE" dirty="0" smtClean="0"/>
               <a:t>-Case-Modell</a:t>
             </a:r>
-            <a:endParaRPr lang="de-DE" dirty="0" smtClean="0"/>
           </a:p>
         </p:txBody>
       </p:sp>
@@ -7801,7 +8283,7 @@
             <a:fld id="{6C6AE60A-B69C-4790-82F7-3882EDF23186}" type="slidenum">
               <a:rPr lang="de-DE" smtClean="0"/>
               <a:pPr/>
-              <a:t>14</a:t>
+              <a:t>17</a:t>
             </a:fld>
             <a:endParaRPr lang="de-DE" dirty="0"/>
           </a:p>
@@ -7845,7 +8327,7 @@
 </p:sld>
 </file>
 
-<file path=ppt/slides/slide15.xml><?xml version="1.0" encoding="utf-8"?>
+<file path=ppt/slides/slide18.xml><?xml version="1.0" encoding="utf-8"?>
 <p:sld xmlns:a="http://schemas.openxmlformats.org/drawingml/2006/main" xmlns:r="http://schemas.openxmlformats.org/officeDocument/2006/relationships" xmlns:p="http://schemas.openxmlformats.org/presentationml/2006/main">
   <p:cSld>
     <p:spTree>
@@ -7965,7 +8447,6 @@
               <a:rPr lang="de-DE" dirty="0" smtClean="0"/>
               <a:t>Live-Demo</a:t>
             </a:r>
-            <a:endParaRPr lang="de-DE" dirty="0" smtClean="0"/>
           </a:p>
           <a:p>
             <a:pPr lvl="1"/>
@@ -8025,7 +8506,7 @@
             <a:fld id="{6C6AE60A-B69C-4790-82F7-3882EDF23186}" type="slidenum">
               <a:rPr lang="de-DE" smtClean="0"/>
               <a:pPr/>
-              <a:t>15</a:t>
+              <a:t>18</a:t>
             </a:fld>
             <a:endParaRPr lang="de-DE" dirty="0"/>
           </a:p>
@@ -8557,15 +9038,7 @@
           <a:p>
             <a:r>
               <a:rPr lang="de-DE" dirty="0" smtClean="0"/>
-              <a:t>Wöchentliches </a:t>
-            </a:r>
-            <a:r>
-              <a:rPr lang="de-DE" dirty="0" smtClean="0"/>
-              <a:t>Jour </a:t>
-            </a:r>
-            <a:r>
-              <a:rPr lang="de-DE" dirty="0" smtClean="0"/>
-              <a:t>fixe</a:t>
+              <a:t>Wöchentliches Jour fixe</a:t>
             </a:r>
           </a:p>
           <a:p>
@@ -8577,11 +9050,7 @@
           <a:p>
             <a:r>
               <a:rPr lang="de-DE" dirty="0" smtClean="0"/>
-              <a:t>Auf- und Verteilung der </a:t>
-            </a:r>
-            <a:r>
-              <a:rPr lang="de-DE" dirty="0" smtClean="0"/>
-              <a:t>Aufgaben/-</a:t>
+              <a:t>Auf- und Verteilung der Aufgaben/-</a:t>
             </a:r>
             <a:r>
               <a:rPr lang="de-DE" dirty="0" err="1" smtClean="0"/>
@@ -8589,15 +9058,7 @@
             </a:r>
             <a:r>
               <a:rPr lang="de-DE" dirty="0" smtClean="0"/>
-              <a:t> </a:t>
-            </a:r>
-            <a:r>
-              <a:rPr lang="de-DE" dirty="0" smtClean="0"/>
-              <a:t>erfolgt generell wochenweise (bei bedarf tageweise</a:t>
-            </a:r>
-            <a:r>
-              <a:rPr lang="de-DE" dirty="0" smtClean="0"/>
-              <a:t>) und flexibel</a:t>
+              <a:t> erfolgt generell wochenweise (bei bedarf tageweise) und flexibel</a:t>
             </a:r>
           </a:p>
           <a:p>
@@ -8606,7 +9067,6 @@
               <a:rPr lang="de-DE" dirty="0" smtClean="0"/>
               <a:t>Transparenz und Nachverfolgung durch Dokumentation in einer Aufgabenliste</a:t>
             </a:r>
-            <a:endParaRPr lang="de-DE" dirty="0" smtClean="0"/>
           </a:p>
         </p:txBody>
       </p:sp>
@@ -8788,15 +9248,7 @@
                   <a:prstClr val="black"/>
                 </a:solidFill>
               </a:rPr>
-              <a:t>Spätere Entscheidung für Freies </a:t>
-            </a:r>
-            <a:r>
-              <a:rPr lang="de-DE" sz="2800" dirty="0" smtClean="0">
-                <a:solidFill>
-                  <a:prstClr val="black"/>
-                </a:solidFill>
-              </a:rPr>
-              <a:t>Repository </a:t>
+              <a:t>Spätere Entscheidung für Freies Repository </a:t>
             </a:r>
             <a:r>
               <a:rPr lang="de-DE" sz="2800" b="1" dirty="0" err="1" smtClean="0">
@@ -9058,15 +9510,7 @@
             <a:pPr lvl="1"/>
             <a:r>
               <a:rPr lang="de-DE" dirty="0" smtClean="0"/>
-              <a:t>Verwendung von </a:t>
-            </a:r>
-            <a:r>
-              <a:rPr lang="de-DE" dirty="0" smtClean="0"/>
-              <a:t>bekannten </a:t>
-            </a:r>
-            <a:r>
-              <a:rPr lang="de-DE" dirty="0" smtClean="0"/>
-              <a:t>und verbreiteten Java-Techniken wie Spring, dem Java </a:t>
+              <a:t>Verwendung von bekannten und verbreiteten Java-Techniken wie Spring, dem Java </a:t>
             </a:r>
             <a:r>
               <a:rPr lang="de-DE" dirty="0" err="1" smtClean="0"/>
@@ -9090,13 +9534,8 @@
             </a:r>
             <a:r>
               <a:rPr lang="de-DE" dirty="0" smtClean="0"/>
-              <a:t> (</a:t>
-            </a:r>
-            <a:r>
-              <a:rPr lang="de-DE" dirty="0" smtClean="0"/>
-              <a:t>GWT)</a:t>
-            </a:r>
-            <a:endParaRPr lang="de-DE" dirty="0" smtClean="0"/>
+              <a:t> (GWT)</a:t>
+            </a:r>
           </a:p>
           <a:p>
             <a:pPr lvl="1"/>
@@ -9104,7 +9543,6 @@
               <a:rPr lang="de-DE" dirty="0" smtClean="0"/>
               <a:t>Konzentration auf den Entwicklungsprozess und nicht auf die Implementierung</a:t>
             </a:r>
-            <a:endParaRPr lang="de-DE" dirty="0" smtClean="0"/>
           </a:p>
         </p:txBody>
       </p:sp>
@@ -9261,11 +9699,7 @@
             </a:r>
             <a:r>
               <a:rPr lang="de-DE" dirty="0" smtClean="0"/>
-              <a:t> API (JPA</a:t>
-            </a:r>
-            <a:r>
-              <a:rPr lang="de-DE" dirty="0" smtClean="0"/>
-              <a:t>)</a:t>
+              <a:t> API (JPA)</a:t>
             </a:r>
           </a:p>
           <a:p>
@@ -9285,14 +9719,12 @@
               <a:rPr lang="de-DE" dirty="0" smtClean="0"/>
               <a:t>Weite Verbreitung</a:t>
             </a:r>
-            <a:endParaRPr lang="de-DE" dirty="0" smtClean="0"/>
           </a:p>
           <a:p>
             <a:r>
               <a:rPr lang="de-DE" dirty="0" smtClean="0"/>
               <a:t>Apache</a:t>
             </a:r>
-            <a:endParaRPr lang="de-DE" dirty="0" smtClean="0"/>
           </a:p>
           <a:p>
             <a:pPr lvl="1"/>
@@ -9461,11 +9893,7 @@
             </a:r>
             <a:r>
               <a:rPr lang="de-DE" dirty="0" smtClean="0"/>
-              <a:t> (</a:t>
-            </a:r>
-            <a:r>
-              <a:rPr lang="de-DE" dirty="0" smtClean="0"/>
-              <a:t>RUP)</a:t>
+              <a:t> (RUP)</a:t>
             </a:r>
             <a:br>
               <a:rPr lang="de-DE" dirty="0" smtClean="0"/>
@@ -9474,7 +9902,6 @@
               <a:rPr lang="de-DE" dirty="0" smtClean="0"/>
               <a:t>als Vorgehensmodell</a:t>
             </a:r>
-            <a:endParaRPr lang="de-DE" dirty="0" smtClean="0"/>
           </a:p>
           <a:p>
             <a:pPr lvl="1"/>
@@ -9496,24 +9923,12 @@
               <a:rPr lang="de-DE" dirty="0" smtClean="0"/>
               <a:t>Unified Modeling Language </a:t>
             </a:r>
-            <a:r>
-              <a:rPr lang="de-DE" dirty="0" smtClean="0"/>
-              <a:t/>
-            </a:r>
             <a:br>
               <a:rPr lang="de-DE" dirty="0" smtClean="0"/>
             </a:br>
             <a:r>
               <a:rPr lang="de-DE" dirty="0" smtClean="0"/>
-              <a:t>(</a:t>
-            </a:r>
-            <a:r>
-              <a:rPr lang="de-DE" dirty="0" smtClean="0"/>
-              <a:t>UML</a:t>
-            </a:r>
-            <a:r>
-              <a:rPr lang="de-DE" dirty="0" smtClean="0"/>
-              <a:t>)</a:t>
+              <a:t>(UML)</a:t>
             </a:r>
           </a:p>
         </p:txBody>
@@ -9678,15 +10093,7 @@
           <a:p>
             <a:r>
               <a:rPr lang="de-DE" dirty="0" smtClean="0"/>
-              <a:t>Zeitraum: 05.03.2012 </a:t>
-            </a:r>
-            <a:r>
-              <a:rPr lang="de-DE" dirty="0" smtClean="0"/>
-              <a:t>- </a:t>
-            </a:r>
-            <a:r>
-              <a:rPr lang="de-DE" dirty="0" smtClean="0"/>
-              <a:t>11.06.2012</a:t>
+              <a:t>Zeitraum: 05.03.2012 - 11.06.2012</a:t>
             </a:r>
           </a:p>
           <a:p>
@@ -9694,7 +10101,6 @@
               <a:rPr lang="de-DE" dirty="0" smtClean="0"/>
               <a:t>Planung:</a:t>
             </a:r>
-            <a:endParaRPr lang="de-DE" dirty="0" smtClean="0"/>
           </a:p>
           <a:p>
             <a:pPr lvl="1"/>

</xml_diff>